<commit_message>
0121 what I have learned
</commit_message>
<xml_diff>
--- a/4_WEB/개인프로젝트/가이드.pptx
+++ b/4_WEB/개인프로젝트/가이드.pptx
@@ -6,8 +6,9 @@
   </p:sldMasterIdLst>
   <p:sldIdLst>
     <p:sldId id="256" r:id="rId2"/>
-    <p:sldId id="257" r:id="rId3"/>
-    <p:sldId id="258" r:id="rId4"/>
+    <p:sldId id="259" r:id="rId3"/>
+    <p:sldId id="257" r:id="rId4"/>
+    <p:sldId id="258" r:id="rId5"/>
   </p:sldIdLst>
   <p:sldSz cx="6858000" cy="9144000" type="screen4x3"/>
   <p:notesSz cx="6858000" cy="9144000"/>
@@ -290,7 +291,7 @@
           <a:p>
             <a:fld id="{48325F59-0410-4EAD-8F65-C37E11122C30}" type="datetimeFigureOut">
               <a:rPr lang="ko-KR" altLang="en-US" smtClean="0"/>
-              <a:t>2020-01-20</a:t>
+              <a:t>2020-01-21</a:t>
             </a:fld>
             <a:endParaRPr lang="ko-KR" altLang="en-US"/>
           </a:p>
@@ -460,7 +461,7 @@
           <a:p>
             <a:fld id="{48325F59-0410-4EAD-8F65-C37E11122C30}" type="datetimeFigureOut">
               <a:rPr lang="ko-KR" altLang="en-US" smtClean="0"/>
-              <a:t>2020-01-20</a:t>
+              <a:t>2020-01-21</a:t>
             </a:fld>
             <a:endParaRPr lang="ko-KR" altLang="en-US"/>
           </a:p>
@@ -640,7 +641,7 @@
           <a:p>
             <a:fld id="{48325F59-0410-4EAD-8F65-C37E11122C30}" type="datetimeFigureOut">
               <a:rPr lang="ko-KR" altLang="en-US" smtClean="0"/>
-              <a:t>2020-01-20</a:t>
+              <a:t>2020-01-21</a:t>
             </a:fld>
             <a:endParaRPr lang="ko-KR" altLang="en-US"/>
           </a:p>
@@ -810,7 +811,7 @@
           <a:p>
             <a:fld id="{48325F59-0410-4EAD-8F65-C37E11122C30}" type="datetimeFigureOut">
               <a:rPr lang="ko-KR" altLang="en-US" smtClean="0"/>
-              <a:t>2020-01-20</a:t>
+              <a:t>2020-01-21</a:t>
             </a:fld>
             <a:endParaRPr lang="ko-KR" altLang="en-US"/>
           </a:p>
@@ -1056,7 +1057,7 @@
           <a:p>
             <a:fld id="{48325F59-0410-4EAD-8F65-C37E11122C30}" type="datetimeFigureOut">
               <a:rPr lang="ko-KR" altLang="en-US" smtClean="0"/>
-              <a:t>2020-01-20</a:t>
+              <a:t>2020-01-21</a:t>
             </a:fld>
             <a:endParaRPr lang="ko-KR" altLang="en-US"/>
           </a:p>
@@ -1344,7 +1345,7 @@
           <a:p>
             <a:fld id="{48325F59-0410-4EAD-8F65-C37E11122C30}" type="datetimeFigureOut">
               <a:rPr lang="ko-KR" altLang="en-US" smtClean="0"/>
-              <a:t>2020-01-20</a:t>
+              <a:t>2020-01-21</a:t>
             </a:fld>
             <a:endParaRPr lang="ko-KR" altLang="en-US"/>
           </a:p>
@@ -1766,7 +1767,7 @@
           <a:p>
             <a:fld id="{48325F59-0410-4EAD-8F65-C37E11122C30}" type="datetimeFigureOut">
               <a:rPr lang="ko-KR" altLang="en-US" smtClean="0"/>
-              <a:t>2020-01-20</a:t>
+              <a:t>2020-01-21</a:t>
             </a:fld>
             <a:endParaRPr lang="ko-KR" altLang="en-US"/>
           </a:p>
@@ -1884,7 +1885,7 @@
           <a:p>
             <a:fld id="{48325F59-0410-4EAD-8F65-C37E11122C30}" type="datetimeFigureOut">
               <a:rPr lang="ko-KR" altLang="en-US" smtClean="0"/>
-              <a:t>2020-01-20</a:t>
+              <a:t>2020-01-21</a:t>
             </a:fld>
             <a:endParaRPr lang="ko-KR" altLang="en-US"/>
           </a:p>
@@ -1979,7 +1980,7 @@
           <a:p>
             <a:fld id="{48325F59-0410-4EAD-8F65-C37E11122C30}" type="datetimeFigureOut">
               <a:rPr lang="ko-KR" altLang="en-US" smtClean="0"/>
-              <a:t>2020-01-20</a:t>
+              <a:t>2020-01-21</a:t>
             </a:fld>
             <a:endParaRPr lang="ko-KR" altLang="en-US"/>
           </a:p>
@@ -2256,7 +2257,7 @@
           <a:p>
             <a:fld id="{48325F59-0410-4EAD-8F65-C37E11122C30}" type="datetimeFigureOut">
               <a:rPr lang="ko-KR" altLang="en-US" smtClean="0"/>
-              <a:t>2020-01-20</a:t>
+              <a:t>2020-01-21</a:t>
             </a:fld>
             <a:endParaRPr lang="ko-KR" altLang="en-US"/>
           </a:p>
@@ -2509,7 +2510,7 @@
           <a:p>
             <a:fld id="{48325F59-0410-4EAD-8F65-C37E11122C30}" type="datetimeFigureOut">
               <a:rPr lang="ko-KR" altLang="en-US" smtClean="0"/>
-              <a:t>2020-01-20</a:t>
+              <a:t>2020-01-21</a:t>
             </a:fld>
             <a:endParaRPr lang="ko-KR" altLang="en-US"/>
           </a:p>
@@ -2722,7 +2723,7 @@
           <a:p>
             <a:fld id="{48325F59-0410-4EAD-8F65-C37E11122C30}" type="datetimeFigureOut">
               <a:rPr lang="ko-KR" altLang="en-US" smtClean="0"/>
-              <a:t>2020-01-20</a:t>
+              <a:t>2020-01-21</a:t>
             </a:fld>
             <a:endParaRPr lang="ko-KR" altLang="en-US"/>
           </a:p>
@@ -3587,7 +3588,7 @@
         </p:nvSpPr>
         <p:spPr>
           <a:xfrm>
-            <a:off x="-4095443" y="611561"/>
+            <a:off x="-4963091" y="611561"/>
             <a:ext cx="3347979" cy="504056"/>
           </a:xfrm>
           <a:prstGeom prst="rect">
@@ -5839,7 +5840,7 @@
       </p:grpSpPr>
       <p:pic>
         <p:nvPicPr>
-          <p:cNvPr id="2051" name="Picture 3"/>
+          <p:cNvPr id="1040" name="Picture 16"/>
           <p:cNvPicPr>
             <a:picLocks noChangeAspect="1" noChangeArrowheads="1"/>
           </p:cNvPicPr>
@@ -5860,8 +5861,8 @@
         </p:blipFill>
         <p:spPr bwMode="auto">
           <a:xfrm>
-            <a:off x="0" y="639763"/>
-            <a:ext cx="6858000" cy="7862887"/>
+            <a:off x="-8177852" y="0"/>
+            <a:ext cx="6477000" cy="6554787"/>
           </a:xfrm>
           <a:prstGeom prst="rect">
             <a:avLst/>
@@ -5901,6 +5902,2667 @@
           </a:extLst>
         </p:spPr>
       </p:pic>
+      <p:sp>
+        <p:nvSpPr>
+          <p:cNvPr id="8" name="직사각형 7"/>
+          <p:cNvSpPr/>
+          <p:nvPr/>
+        </p:nvSpPr>
+        <p:spPr>
+          <a:xfrm>
+            <a:off x="-3065743" y="-692467"/>
+            <a:ext cx="2832638" cy="575232"/>
+          </a:xfrm>
+          <a:prstGeom prst="rect">
+            <a:avLst/>
+          </a:prstGeom>
+        </p:spPr>
+        <p:style>
+          <a:lnRef idx="2">
+            <a:schemeClr val="accent1">
+              <a:shade val="50000"/>
+            </a:schemeClr>
+          </a:lnRef>
+          <a:fillRef idx="1">
+            <a:schemeClr val="accent1"/>
+          </a:fillRef>
+          <a:effectRef idx="0">
+            <a:schemeClr val="accent1"/>
+          </a:effectRef>
+          <a:fontRef idx="minor">
+            <a:schemeClr val="lt1"/>
+          </a:fontRef>
+        </p:style>
+        <p:txBody>
+          <a:bodyPr rtlCol="0" anchor="ctr"/>
+          <a:lstStyle/>
+          <a:p>
+            <a:pPr algn="ctr"/>
+            <a:r>
+              <a:rPr lang="ko-KR" altLang="en-US" sz="1600" b="1" dirty="0" smtClean="0"/>
+              <a:t>메뉴</a:t>
+            </a:r>
+            <a:r>
+              <a:rPr lang="en-US" altLang="ko-KR" sz="1600" b="1" dirty="0" smtClean="0"/>
+              <a:t>, </a:t>
+            </a:r>
+            <a:r>
+              <a:rPr lang="ko-KR" altLang="en-US" sz="1600" b="1" dirty="0" smtClean="0"/>
+              <a:t>돋보기 버튼 클릭 시</a:t>
+            </a:r>
+            <a:endParaRPr lang="ko-KR" altLang="en-US" sz="1600" b="1" dirty="0"/>
+          </a:p>
+        </p:txBody>
+      </p:sp>
+      <p:sp>
+        <p:nvSpPr>
+          <p:cNvPr id="27" name="직사각형 26"/>
+          <p:cNvSpPr/>
+          <p:nvPr/>
+        </p:nvSpPr>
+        <p:spPr>
+          <a:xfrm>
+            <a:off x="-8187690" y="-6392"/>
+            <a:ext cx="2059399" cy="6547531"/>
+          </a:xfrm>
+          <a:prstGeom prst="rect">
+            <a:avLst/>
+          </a:prstGeom>
+          <a:noFill/>
+          <a:ln>
+            <a:solidFill>
+              <a:srgbClr val="FF0000"/>
+            </a:solidFill>
+          </a:ln>
+        </p:spPr>
+        <p:style>
+          <a:lnRef idx="2">
+            <a:schemeClr val="accent1">
+              <a:shade val="50000"/>
+            </a:schemeClr>
+          </a:lnRef>
+          <a:fillRef idx="1">
+            <a:schemeClr val="accent1"/>
+          </a:fillRef>
+          <a:effectRef idx="0">
+            <a:schemeClr val="accent1"/>
+          </a:effectRef>
+          <a:fontRef idx="minor">
+            <a:schemeClr val="lt1"/>
+          </a:fontRef>
+        </p:style>
+        <p:txBody>
+          <a:bodyPr rtlCol="0" anchor="ctr"/>
+          <a:lstStyle/>
+          <a:p>
+            <a:pPr algn="ctr"/>
+            <a:endParaRPr lang="ko-KR" altLang="en-US">
+              <a:solidFill>
+                <a:schemeClr val="tx2"/>
+              </a:solidFill>
+            </a:endParaRPr>
+          </a:p>
+        </p:txBody>
+      </p:sp>
+      <p:sp>
+        <p:nvSpPr>
+          <p:cNvPr id="28" name="직사각형 27"/>
+          <p:cNvSpPr/>
+          <p:nvPr/>
+        </p:nvSpPr>
+        <p:spPr>
+          <a:xfrm>
+            <a:off x="-4963091" y="611561"/>
+            <a:ext cx="3347979" cy="504056"/>
+          </a:xfrm>
+          <a:prstGeom prst="rect">
+            <a:avLst/>
+          </a:prstGeom>
+          <a:noFill/>
+          <a:ln>
+            <a:solidFill>
+              <a:srgbClr val="FF0000"/>
+            </a:solidFill>
+          </a:ln>
+        </p:spPr>
+        <p:style>
+          <a:lnRef idx="2">
+            <a:schemeClr val="accent1">
+              <a:shade val="50000"/>
+            </a:schemeClr>
+          </a:lnRef>
+          <a:fillRef idx="1">
+            <a:schemeClr val="accent1"/>
+          </a:fillRef>
+          <a:effectRef idx="0">
+            <a:schemeClr val="accent1"/>
+          </a:effectRef>
+          <a:fontRef idx="minor">
+            <a:schemeClr val="lt1"/>
+          </a:fontRef>
+        </p:style>
+        <p:txBody>
+          <a:bodyPr rtlCol="0" anchor="ctr"/>
+          <a:lstStyle/>
+          <a:p>
+            <a:pPr algn="ctr"/>
+            <a:endParaRPr lang="ko-KR" altLang="en-US">
+              <a:solidFill>
+                <a:schemeClr val="tx2"/>
+              </a:solidFill>
+            </a:endParaRPr>
+          </a:p>
+        </p:txBody>
+      </p:sp>
+      <p:pic>
+        <p:nvPicPr>
+          <p:cNvPr id="1041" name="Picture 17"/>
+          <p:cNvPicPr>
+            <a:picLocks noChangeAspect="1" noChangeArrowheads="1"/>
+          </p:cNvPicPr>
+          <p:nvPr/>
+        </p:nvPicPr>
+        <p:blipFill rotWithShape="1">
+          <a:blip r:embed="rId3">
+            <a:extLst>
+              <a:ext uri="{28A0092B-C50C-407E-A947-70E740481C1C}">
+                <a14:useLocalDpi xmlns:a14="http://schemas.microsoft.com/office/drawing/2010/main" val="0"/>
+              </a:ext>
+            </a:extLst>
+          </a:blip>
+          <a:srcRect b="34484"/>
+          <a:stretch/>
+        </p:blipFill>
+        <p:spPr bwMode="auto">
+          <a:xfrm>
+            <a:off x="-23190" y="35158"/>
+            <a:ext cx="6881189" cy="1127425"/>
+          </a:xfrm>
+          <a:prstGeom prst="rect">
+            <a:avLst/>
+          </a:prstGeom>
+          <a:noFill/>
+          <a:ln>
+            <a:noFill/>
+          </a:ln>
+          <a:effectLst/>
+          <a:extLst>
+            <a:ext uri="{909E8E84-426E-40DD-AFC4-6F175D3DCCD1}">
+              <a14:hiddenFill xmlns:a14="http://schemas.microsoft.com/office/drawing/2010/main">
+                <a:solidFill>
+                  <a:schemeClr val="accent1"/>
+                </a:solidFill>
+              </a14:hiddenFill>
+            </a:ext>
+            <a:ext uri="{91240B29-F687-4F45-9708-019B960494DF}">
+              <a14:hiddenLine xmlns:a14="http://schemas.microsoft.com/office/drawing/2010/main" w="9525">
+                <a:solidFill>
+                  <a:schemeClr val="tx1"/>
+                </a:solidFill>
+                <a:miter lim="800000"/>
+                <a:headEnd/>
+                <a:tailEnd/>
+              </a14:hiddenLine>
+            </a:ext>
+            <a:ext uri="{AF507438-7753-43E0-B8FC-AC1667EBCBE1}">
+              <a14:hiddenEffects xmlns:a14="http://schemas.microsoft.com/office/drawing/2010/main">
+                <a:effectLst>
+                  <a:outerShdw dist="35921" dir="2700000" algn="ctr" rotWithShape="0">
+                    <a:schemeClr val="bg2"/>
+                  </a:outerShdw>
+                </a:effectLst>
+              </a14:hiddenEffects>
+            </a:ext>
+          </a:extLst>
+        </p:spPr>
+      </p:pic>
+      <p:sp>
+        <p:nvSpPr>
+          <p:cNvPr id="41" name="직사각형 40"/>
+          <p:cNvSpPr/>
+          <p:nvPr/>
+        </p:nvSpPr>
+        <p:spPr>
+          <a:xfrm>
+            <a:off x="132024" y="827584"/>
+            <a:ext cx="6718652" cy="256786"/>
+          </a:xfrm>
+          <a:prstGeom prst="rect">
+            <a:avLst/>
+          </a:prstGeom>
+          <a:solidFill>
+            <a:schemeClr val="tx1">
+              <a:alpha val="50000"/>
+            </a:schemeClr>
+          </a:solidFill>
+        </p:spPr>
+        <p:style>
+          <a:lnRef idx="2">
+            <a:schemeClr val="accent1">
+              <a:shade val="50000"/>
+            </a:schemeClr>
+          </a:lnRef>
+          <a:fillRef idx="1">
+            <a:schemeClr val="accent1"/>
+          </a:fillRef>
+          <a:effectRef idx="0">
+            <a:schemeClr val="accent1"/>
+          </a:effectRef>
+          <a:fontRef idx="minor">
+            <a:schemeClr val="lt1"/>
+          </a:fontRef>
+        </p:style>
+        <p:txBody>
+          <a:bodyPr rtlCol="0" anchor="ctr"/>
+          <a:lstStyle/>
+          <a:p>
+            <a:pPr algn="ctr"/>
+            <a:r>
+              <a:rPr lang="en-US" altLang="ko-KR" b="1" dirty="0" smtClean="0"/>
+              <a:t>.</a:t>
+            </a:r>
+            <a:r>
+              <a:rPr lang="en-US" altLang="ko-KR" b="1" dirty="0" err="1" smtClean="0"/>
+              <a:t>lnb</a:t>
+            </a:r>
+            <a:endParaRPr lang="ko-KR" altLang="en-US" b="1" dirty="0"/>
+          </a:p>
+        </p:txBody>
+      </p:sp>
+      <p:sp>
+        <p:nvSpPr>
+          <p:cNvPr id="42" name="직사각형 41"/>
+          <p:cNvSpPr/>
+          <p:nvPr/>
+        </p:nvSpPr>
+        <p:spPr>
+          <a:xfrm>
+            <a:off x="2430906" y="403616"/>
+            <a:ext cx="2438253" cy="375709"/>
+          </a:xfrm>
+          <a:prstGeom prst="rect">
+            <a:avLst/>
+          </a:prstGeom>
+          <a:solidFill>
+            <a:schemeClr val="tx1">
+              <a:alpha val="50000"/>
+            </a:schemeClr>
+          </a:solidFill>
+        </p:spPr>
+        <p:style>
+          <a:lnRef idx="2">
+            <a:schemeClr val="accent1">
+              <a:shade val="50000"/>
+            </a:schemeClr>
+          </a:lnRef>
+          <a:fillRef idx="1">
+            <a:schemeClr val="accent1"/>
+          </a:fillRef>
+          <a:effectRef idx="0">
+            <a:schemeClr val="accent1"/>
+          </a:effectRef>
+          <a:fontRef idx="minor">
+            <a:schemeClr val="lt1"/>
+          </a:fontRef>
+        </p:style>
+        <p:txBody>
+          <a:bodyPr rtlCol="0" anchor="ctr"/>
+          <a:lstStyle/>
+          <a:p>
+            <a:pPr algn="ctr"/>
+            <a:r>
+              <a:rPr lang="en-US" altLang="ko-KR" b="1" dirty="0" smtClean="0"/>
+              <a:t>img</a:t>
+            </a:r>
+            <a:r>
+              <a:rPr lang="en-US" altLang="ko-KR" b="1" dirty="0" smtClean="0"/>
+              <a:t>.logo</a:t>
+            </a:r>
+            <a:endParaRPr lang="ko-KR" altLang="en-US" b="1" dirty="0"/>
+          </a:p>
+        </p:txBody>
+      </p:sp>
+      <p:sp>
+        <p:nvSpPr>
+          <p:cNvPr id="43" name="직사각형 42"/>
+          <p:cNvSpPr/>
+          <p:nvPr/>
+        </p:nvSpPr>
+        <p:spPr>
+          <a:xfrm>
+            <a:off x="5517232" y="70120"/>
+            <a:ext cx="653972" cy="253408"/>
+          </a:xfrm>
+          <a:prstGeom prst="rect">
+            <a:avLst/>
+          </a:prstGeom>
+          <a:solidFill>
+            <a:schemeClr val="tx1">
+              <a:alpha val="50000"/>
+            </a:schemeClr>
+          </a:solidFill>
+        </p:spPr>
+        <p:style>
+          <a:lnRef idx="2">
+            <a:schemeClr val="accent1">
+              <a:shade val="50000"/>
+            </a:schemeClr>
+          </a:lnRef>
+          <a:fillRef idx="1">
+            <a:schemeClr val="accent1"/>
+          </a:fillRef>
+          <a:effectRef idx="0">
+            <a:schemeClr val="accent1"/>
+          </a:effectRef>
+          <a:fontRef idx="minor">
+            <a:schemeClr val="lt1"/>
+          </a:fontRef>
+        </p:style>
+        <p:txBody>
+          <a:bodyPr rtlCol="0" anchor="ctr"/>
+          <a:lstStyle/>
+          <a:p>
+            <a:pPr algn="ctr"/>
+            <a:r>
+              <a:rPr lang="en-US" altLang="ko-KR" b="1" dirty="0" smtClean="0"/>
+              <a:t>.sub</a:t>
+            </a:r>
+            <a:endParaRPr lang="ko-KR" altLang="en-US" b="1" dirty="0"/>
+          </a:p>
+        </p:txBody>
+      </p:sp>
+      <p:sp>
+        <p:nvSpPr>
+          <p:cNvPr id="44" name="직사각형 43"/>
+          <p:cNvSpPr/>
+          <p:nvPr/>
+        </p:nvSpPr>
+        <p:spPr>
+          <a:xfrm>
+            <a:off x="6234830" y="83697"/>
+            <a:ext cx="501546" cy="241024"/>
+          </a:xfrm>
+          <a:prstGeom prst="rect">
+            <a:avLst/>
+          </a:prstGeom>
+          <a:solidFill>
+            <a:schemeClr val="tx1">
+              <a:alpha val="50000"/>
+            </a:schemeClr>
+          </a:solidFill>
+        </p:spPr>
+        <p:style>
+          <a:lnRef idx="2">
+            <a:schemeClr val="accent1">
+              <a:shade val="50000"/>
+            </a:schemeClr>
+          </a:lnRef>
+          <a:fillRef idx="1">
+            <a:schemeClr val="accent1"/>
+          </a:fillRef>
+          <a:effectRef idx="0">
+            <a:schemeClr val="accent1"/>
+          </a:effectRef>
+          <a:fontRef idx="minor">
+            <a:schemeClr val="lt1"/>
+          </a:fontRef>
+        </p:style>
+        <p:txBody>
+          <a:bodyPr rtlCol="0" anchor="ctr"/>
+          <a:lstStyle/>
+          <a:p>
+            <a:pPr algn="ctr"/>
+            <a:r>
+              <a:rPr lang="en-US" altLang="ko-KR" sz="1400" b="1" dirty="0" smtClean="0"/>
+              <a:t>.log</a:t>
+            </a:r>
+            <a:endParaRPr lang="ko-KR" altLang="en-US" sz="1400" b="1" dirty="0"/>
+          </a:p>
+        </p:txBody>
+      </p:sp>
+      <p:sp>
+        <p:nvSpPr>
+          <p:cNvPr id="45" name="직사각형 44"/>
+          <p:cNvSpPr/>
+          <p:nvPr/>
+        </p:nvSpPr>
+        <p:spPr>
+          <a:xfrm>
+            <a:off x="514030" y="64739"/>
+            <a:ext cx="874012" cy="259982"/>
+          </a:xfrm>
+          <a:prstGeom prst="rect">
+            <a:avLst/>
+          </a:prstGeom>
+          <a:solidFill>
+            <a:schemeClr val="tx1">
+              <a:alpha val="50000"/>
+            </a:schemeClr>
+          </a:solidFill>
+        </p:spPr>
+        <p:style>
+          <a:lnRef idx="2">
+            <a:schemeClr val="accent1">
+              <a:shade val="50000"/>
+            </a:schemeClr>
+          </a:lnRef>
+          <a:fillRef idx="1">
+            <a:schemeClr val="accent1"/>
+          </a:fillRef>
+          <a:effectRef idx="0">
+            <a:schemeClr val="accent1"/>
+          </a:effectRef>
+          <a:fontRef idx="minor">
+            <a:schemeClr val="lt1"/>
+          </a:fontRef>
+        </p:style>
+        <p:txBody>
+          <a:bodyPr rtlCol="0" anchor="ctr"/>
+          <a:lstStyle/>
+          <a:p>
+            <a:pPr algn="ctr"/>
+            <a:r>
+              <a:rPr lang="en-US" altLang="ko-KR" sz="1400" b="1" dirty="0" smtClean="0"/>
+              <a:t>.search</a:t>
+            </a:r>
+            <a:endParaRPr lang="ko-KR" altLang="en-US" sz="1400" b="1" dirty="0"/>
+          </a:p>
+        </p:txBody>
+      </p:sp>
+      <p:sp>
+        <p:nvSpPr>
+          <p:cNvPr id="46" name="직사각형 45"/>
+          <p:cNvSpPr/>
+          <p:nvPr/>
+        </p:nvSpPr>
+        <p:spPr>
+          <a:xfrm>
+            <a:off x="1430548" y="64739"/>
+            <a:ext cx="1000359" cy="256519"/>
+          </a:xfrm>
+          <a:prstGeom prst="rect">
+            <a:avLst/>
+          </a:prstGeom>
+          <a:solidFill>
+            <a:schemeClr val="tx1">
+              <a:alpha val="50000"/>
+            </a:schemeClr>
+          </a:solidFill>
+        </p:spPr>
+        <p:style>
+          <a:lnRef idx="2">
+            <a:schemeClr val="accent1">
+              <a:shade val="50000"/>
+            </a:schemeClr>
+          </a:lnRef>
+          <a:fillRef idx="1">
+            <a:schemeClr val="accent1"/>
+          </a:fillRef>
+          <a:effectRef idx="0">
+            <a:schemeClr val="accent1"/>
+          </a:effectRef>
+          <a:fontRef idx="minor">
+            <a:schemeClr val="lt1"/>
+          </a:fontRef>
+        </p:style>
+        <p:txBody>
+          <a:bodyPr rtlCol="0" anchor="ctr"/>
+          <a:lstStyle/>
+          <a:p>
+            <a:pPr algn="ctr"/>
+            <a:r>
+              <a:rPr lang="en-US" altLang="ko-KR" sz="1200" b="1" dirty="0" smtClean="0"/>
+              <a:t>.btnsearch</a:t>
+            </a:r>
+            <a:endParaRPr lang="ko-KR" altLang="en-US" sz="1200" b="1" dirty="0"/>
+          </a:p>
+        </p:txBody>
+      </p:sp>
+      <p:sp>
+        <p:nvSpPr>
+          <p:cNvPr id="7" name="직사각형 6"/>
+          <p:cNvSpPr/>
+          <p:nvPr/>
+        </p:nvSpPr>
+        <p:spPr>
+          <a:xfrm>
+            <a:off x="28796" y="-1"/>
+            <a:ext cx="6829203" cy="1139367"/>
+          </a:xfrm>
+          <a:prstGeom prst="rect">
+            <a:avLst/>
+          </a:prstGeom>
+          <a:noFill/>
+          <a:ln>
+            <a:solidFill>
+              <a:srgbClr val="FF0000"/>
+            </a:solidFill>
+          </a:ln>
+        </p:spPr>
+        <p:style>
+          <a:lnRef idx="2">
+            <a:schemeClr val="accent1">
+              <a:shade val="50000"/>
+            </a:schemeClr>
+          </a:lnRef>
+          <a:fillRef idx="1">
+            <a:schemeClr val="accent1"/>
+          </a:fillRef>
+          <a:effectRef idx="0">
+            <a:schemeClr val="accent1"/>
+          </a:effectRef>
+          <a:fontRef idx="minor">
+            <a:schemeClr val="lt1"/>
+          </a:fontRef>
+        </p:style>
+        <p:txBody>
+          <a:bodyPr rtlCol="0" anchor="ctr"/>
+          <a:lstStyle/>
+          <a:p>
+            <a:pPr algn="ctr"/>
+            <a:endParaRPr lang="ko-KR" altLang="en-US">
+              <a:solidFill>
+                <a:schemeClr val="tx2"/>
+              </a:solidFill>
+            </a:endParaRPr>
+          </a:p>
+        </p:txBody>
+      </p:sp>
+      <p:pic>
+        <p:nvPicPr>
+          <p:cNvPr id="1043" name="Picture 19"/>
+          <p:cNvPicPr>
+            <a:picLocks noChangeAspect="1" noChangeArrowheads="1"/>
+          </p:cNvPicPr>
+          <p:nvPr/>
+        </p:nvPicPr>
+        <p:blipFill>
+          <a:blip r:embed="rId4">
+            <a:extLst>
+              <a:ext uri="{28A0092B-C50C-407E-A947-70E740481C1C}">
+                <a14:useLocalDpi xmlns:a14="http://schemas.microsoft.com/office/drawing/2010/main" val="0"/>
+              </a:ext>
+            </a:extLst>
+          </a:blip>
+          <a:srcRect/>
+          <a:stretch>
+            <a:fillRect/>
+          </a:stretch>
+        </p:blipFill>
+        <p:spPr bwMode="auto">
+          <a:xfrm>
+            <a:off x="-23190" y="8674100"/>
+            <a:ext cx="6860308" cy="469900"/>
+          </a:xfrm>
+          <a:prstGeom prst="rect">
+            <a:avLst/>
+          </a:prstGeom>
+          <a:noFill/>
+          <a:ln>
+            <a:noFill/>
+          </a:ln>
+          <a:effectLst/>
+          <a:extLst>
+            <a:ext uri="{909E8E84-426E-40DD-AFC4-6F175D3DCCD1}">
+              <a14:hiddenFill xmlns:a14="http://schemas.microsoft.com/office/drawing/2010/main">
+                <a:solidFill>
+                  <a:schemeClr val="accent1"/>
+                </a:solidFill>
+              </a14:hiddenFill>
+            </a:ext>
+            <a:ext uri="{91240B29-F687-4F45-9708-019B960494DF}">
+              <a14:hiddenLine xmlns:a14="http://schemas.microsoft.com/office/drawing/2010/main" w="9525">
+                <a:solidFill>
+                  <a:schemeClr val="tx1"/>
+                </a:solidFill>
+                <a:miter lim="800000"/>
+                <a:headEnd/>
+                <a:tailEnd/>
+              </a14:hiddenLine>
+            </a:ext>
+            <a:ext uri="{AF507438-7753-43E0-B8FC-AC1667EBCBE1}">
+              <a14:hiddenEffects xmlns:a14="http://schemas.microsoft.com/office/drawing/2010/main">
+                <a:effectLst>
+                  <a:outerShdw dist="35921" dir="2700000" algn="ctr" rotWithShape="0">
+                    <a:schemeClr val="bg2"/>
+                  </a:outerShdw>
+                </a:effectLst>
+              </a14:hiddenEffects>
+            </a:ext>
+          </a:extLst>
+        </p:spPr>
+      </p:pic>
+      <p:sp>
+        <p:nvSpPr>
+          <p:cNvPr id="49" name="직사각형 48"/>
+          <p:cNvSpPr/>
+          <p:nvPr/>
+        </p:nvSpPr>
+        <p:spPr>
+          <a:xfrm>
+            <a:off x="24156" y="8616826"/>
+            <a:ext cx="6867980" cy="527174"/>
+          </a:xfrm>
+          <a:prstGeom prst="rect">
+            <a:avLst/>
+          </a:prstGeom>
+          <a:noFill/>
+          <a:ln>
+            <a:solidFill>
+              <a:srgbClr val="FF0000"/>
+            </a:solidFill>
+          </a:ln>
+        </p:spPr>
+        <p:style>
+          <a:lnRef idx="2">
+            <a:schemeClr val="accent1">
+              <a:shade val="50000"/>
+            </a:schemeClr>
+          </a:lnRef>
+          <a:fillRef idx="1">
+            <a:schemeClr val="accent1"/>
+          </a:fillRef>
+          <a:effectRef idx="0">
+            <a:schemeClr val="accent1"/>
+          </a:effectRef>
+          <a:fontRef idx="minor">
+            <a:schemeClr val="lt1"/>
+          </a:fontRef>
+        </p:style>
+        <p:txBody>
+          <a:bodyPr rtlCol="0" anchor="ctr"/>
+          <a:lstStyle/>
+          <a:p>
+            <a:pPr algn="ctr"/>
+            <a:endParaRPr lang="ko-KR" altLang="en-US">
+              <a:solidFill>
+                <a:schemeClr val="tx2"/>
+              </a:solidFill>
+            </a:endParaRPr>
+          </a:p>
+        </p:txBody>
+      </p:sp>
+      <p:sp>
+        <p:nvSpPr>
+          <p:cNvPr id="53" name="직사각형 52"/>
+          <p:cNvSpPr/>
+          <p:nvPr/>
+        </p:nvSpPr>
+        <p:spPr>
+          <a:xfrm>
+            <a:off x="78842" y="8659742"/>
+            <a:ext cx="6689066" cy="414337"/>
+          </a:xfrm>
+          <a:prstGeom prst="rect">
+            <a:avLst/>
+          </a:prstGeom>
+          <a:solidFill>
+            <a:schemeClr val="tx1">
+              <a:alpha val="50000"/>
+            </a:schemeClr>
+          </a:solidFill>
+        </p:spPr>
+        <p:style>
+          <a:lnRef idx="2">
+            <a:schemeClr val="accent1">
+              <a:shade val="50000"/>
+            </a:schemeClr>
+          </a:lnRef>
+          <a:fillRef idx="1">
+            <a:schemeClr val="accent1"/>
+          </a:fillRef>
+          <a:effectRef idx="0">
+            <a:schemeClr val="accent1"/>
+          </a:effectRef>
+          <a:fontRef idx="minor">
+            <a:schemeClr val="lt1"/>
+          </a:fontRef>
+        </p:style>
+        <p:txBody>
+          <a:bodyPr rtlCol="0" anchor="ctr"/>
+          <a:lstStyle/>
+          <a:p>
+            <a:pPr algn="ctr"/>
+            <a:r>
+              <a:rPr lang="en-US" altLang="ko-KR" b="1" dirty="0" smtClean="0"/>
+              <a:t>footer</a:t>
+            </a:r>
+            <a:endParaRPr lang="ko-KR" altLang="en-US" b="1" dirty="0"/>
+          </a:p>
+        </p:txBody>
+      </p:sp>
+      <p:sp>
+        <p:nvSpPr>
+          <p:cNvPr id="60" name="TextBox 59"/>
+          <p:cNvSpPr txBox="1"/>
+          <p:nvPr/>
+        </p:nvSpPr>
+        <p:spPr>
+          <a:xfrm>
+            <a:off x="6831085" y="-387969"/>
+            <a:ext cx="938077" cy="369332"/>
+          </a:xfrm>
+          <a:prstGeom prst="rect">
+            <a:avLst/>
+          </a:prstGeom>
+          <a:solidFill>
+            <a:srgbClr val="FF0000"/>
+          </a:solidFill>
+        </p:spPr>
+        <p:txBody>
+          <a:bodyPr wrap="none" rtlCol="0">
+            <a:spAutoFit/>
+          </a:bodyPr>
+          <a:lstStyle/>
+          <a:p>
+            <a:r>
+              <a:rPr lang="en-US" altLang="ko-KR" b="1" dirty="0" smtClean="0">
+                <a:solidFill>
+                  <a:schemeClr val="bg1"/>
+                </a:solidFill>
+              </a:rPr>
+              <a:t>header</a:t>
+            </a:r>
+            <a:endParaRPr lang="ko-KR" altLang="en-US" b="1" dirty="0">
+              <a:solidFill>
+                <a:schemeClr val="bg1"/>
+              </a:solidFill>
+            </a:endParaRPr>
+          </a:p>
+        </p:txBody>
+      </p:sp>
+      <p:sp>
+        <p:nvSpPr>
+          <p:cNvPr id="61" name="TextBox 60"/>
+          <p:cNvSpPr txBox="1"/>
+          <p:nvPr/>
+        </p:nvSpPr>
+        <p:spPr>
+          <a:xfrm>
+            <a:off x="6047490" y="1139331"/>
+            <a:ext cx="966931" cy="369332"/>
+          </a:xfrm>
+          <a:prstGeom prst="rect">
+            <a:avLst/>
+          </a:prstGeom>
+          <a:solidFill>
+            <a:srgbClr val="FF0000"/>
+          </a:solidFill>
+        </p:spPr>
+        <p:txBody>
+          <a:bodyPr wrap="none" rtlCol="0">
+            <a:spAutoFit/>
+          </a:bodyPr>
+          <a:lstStyle/>
+          <a:p>
+            <a:r>
+              <a:rPr lang="en-US" altLang="ko-KR" b="1" dirty="0" smtClean="0">
+                <a:solidFill>
+                  <a:schemeClr val="bg1"/>
+                </a:solidFill>
+              </a:rPr>
+              <a:t>section</a:t>
+            </a:r>
+            <a:endParaRPr lang="ko-KR" altLang="en-US" b="1" dirty="0">
+              <a:solidFill>
+                <a:schemeClr val="bg1"/>
+              </a:solidFill>
+            </a:endParaRPr>
+          </a:p>
+        </p:txBody>
+      </p:sp>
+      <p:sp>
+        <p:nvSpPr>
+          <p:cNvPr id="62" name="TextBox 61"/>
+          <p:cNvSpPr txBox="1"/>
+          <p:nvPr/>
+        </p:nvSpPr>
+        <p:spPr>
+          <a:xfrm>
+            <a:off x="6869269" y="8809823"/>
+            <a:ext cx="861711" cy="369332"/>
+          </a:xfrm>
+          <a:prstGeom prst="rect">
+            <a:avLst/>
+          </a:prstGeom>
+          <a:solidFill>
+            <a:srgbClr val="FF0000"/>
+          </a:solidFill>
+        </p:spPr>
+        <p:txBody>
+          <a:bodyPr wrap="none" rtlCol="0">
+            <a:spAutoFit/>
+          </a:bodyPr>
+          <a:lstStyle/>
+          <a:p>
+            <a:r>
+              <a:rPr lang="en-US" altLang="ko-KR" b="1" dirty="0" smtClean="0">
+                <a:solidFill>
+                  <a:schemeClr val="bg1"/>
+                </a:solidFill>
+              </a:rPr>
+              <a:t>footer</a:t>
+            </a:r>
+            <a:endParaRPr lang="ko-KR" altLang="en-US" b="1" dirty="0">
+              <a:solidFill>
+                <a:schemeClr val="bg1"/>
+              </a:solidFill>
+            </a:endParaRPr>
+          </a:p>
+        </p:txBody>
+      </p:sp>
+      <p:grpSp>
+        <p:nvGrpSpPr>
+          <p:cNvPr id="2" name="그룹 1"/>
+          <p:cNvGrpSpPr/>
+          <p:nvPr/>
+        </p:nvGrpSpPr>
+        <p:grpSpPr>
+          <a:xfrm>
+            <a:off x="951036" y="1139366"/>
+            <a:ext cx="5106603" cy="7465082"/>
+            <a:chOff x="28797" y="1139366"/>
+            <a:chExt cx="6821879" cy="7465082"/>
+          </a:xfrm>
+        </p:grpSpPr>
+        <p:pic>
+          <p:nvPicPr>
+            <p:cNvPr id="1028" name="Picture 4"/>
+            <p:cNvPicPr>
+              <a:picLocks noChangeAspect="1" noChangeArrowheads="1"/>
+            </p:cNvPicPr>
+            <p:nvPr/>
+          </p:nvPicPr>
+          <p:blipFill>
+            <a:blip r:embed="rId5">
+              <a:extLst>
+                <a:ext uri="{28A0092B-C50C-407E-A947-70E740481C1C}">
+                  <a14:useLocalDpi xmlns:a14="http://schemas.microsoft.com/office/drawing/2010/main" val="0"/>
+                </a:ext>
+              </a:extLst>
+            </a:blip>
+            <a:srcRect/>
+            <a:stretch>
+              <a:fillRect/>
+            </a:stretch>
+          </p:blipFill>
+          <p:spPr bwMode="auto">
+            <a:xfrm>
+              <a:off x="4627980" y="5280730"/>
+              <a:ext cx="2105912" cy="3168352"/>
+            </a:xfrm>
+            <a:prstGeom prst="rect">
+              <a:avLst/>
+            </a:prstGeom>
+            <a:noFill/>
+            <a:ln>
+              <a:noFill/>
+            </a:ln>
+            <a:effectLst/>
+            <a:extLst>
+              <a:ext uri="{909E8E84-426E-40DD-AFC4-6F175D3DCCD1}">
+                <a14:hiddenFill xmlns:a14="http://schemas.microsoft.com/office/drawing/2010/main">
+                  <a:solidFill>
+                    <a:schemeClr val="accent1"/>
+                  </a:solidFill>
+                </a14:hiddenFill>
+              </a:ext>
+              <a:ext uri="{91240B29-F687-4F45-9708-019B960494DF}">
+                <a14:hiddenLine xmlns:a14="http://schemas.microsoft.com/office/drawing/2010/main" w="9525">
+                  <a:solidFill>
+                    <a:schemeClr val="tx1"/>
+                  </a:solidFill>
+                  <a:miter lim="800000"/>
+                  <a:headEnd/>
+                  <a:tailEnd/>
+                </a14:hiddenLine>
+              </a:ext>
+              <a:ext uri="{AF507438-7753-43E0-B8FC-AC1667EBCBE1}">
+                <a14:hiddenEffects xmlns:a14="http://schemas.microsoft.com/office/drawing/2010/main">
+                  <a:effectLst>
+                    <a:outerShdw dist="35921" dir="2700000" algn="ctr" rotWithShape="0">
+                      <a:schemeClr val="bg2"/>
+                    </a:outerShdw>
+                  </a:effectLst>
+                </a14:hiddenEffects>
+              </a:ext>
+            </a:extLst>
+          </p:spPr>
+        </p:pic>
+        <p:pic>
+          <p:nvPicPr>
+            <p:cNvPr id="1029" name="Picture 5"/>
+            <p:cNvPicPr>
+              <a:picLocks noChangeAspect="1" noChangeArrowheads="1"/>
+            </p:cNvPicPr>
+            <p:nvPr/>
+          </p:nvPicPr>
+          <p:blipFill>
+            <a:blip r:embed="rId6">
+              <a:extLst>
+                <a:ext uri="{28A0092B-C50C-407E-A947-70E740481C1C}">
+                  <a14:useLocalDpi xmlns:a14="http://schemas.microsoft.com/office/drawing/2010/main" val="0"/>
+                </a:ext>
+              </a:extLst>
+            </a:blip>
+            <a:srcRect/>
+            <a:stretch>
+              <a:fillRect/>
+            </a:stretch>
+          </p:blipFill>
+          <p:spPr bwMode="auto">
+            <a:xfrm>
+              <a:off x="4693588" y="3654750"/>
+              <a:ext cx="2157088" cy="1625980"/>
+            </a:xfrm>
+            <a:prstGeom prst="rect">
+              <a:avLst/>
+            </a:prstGeom>
+            <a:noFill/>
+            <a:ln>
+              <a:noFill/>
+            </a:ln>
+            <a:effectLst/>
+            <a:extLst>
+              <a:ext uri="{909E8E84-426E-40DD-AFC4-6F175D3DCCD1}">
+                <a14:hiddenFill xmlns:a14="http://schemas.microsoft.com/office/drawing/2010/main">
+                  <a:solidFill>
+                    <a:schemeClr val="accent1"/>
+                  </a:solidFill>
+                </a14:hiddenFill>
+              </a:ext>
+              <a:ext uri="{91240B29-F687-4F45-9708-019B960494DF}">
+                <a14:hiddenLine xmlns:a14="http://schemas.microsoft.com/office/drawing/2010/main" w="9525">
+                  <a:solidFill>
+                    <a:schemeClr val="tx1"/>
+                  </a:solidFill>
+                  <a:miter lim="800000"/>
+                  <a:headEnd/>
+                  <a:tailEnd/>
+                </a14:hiddenLine>
+              </a:ext>
+              <a:ext uri="{AF507438-7753-43E0-B8FC-AC1667EBCBE1}">
+                <a14:hiddenEffects xmlns:a14="http://schemas.microsoft.com/office/drawing/2010/main">
+                  <a:effectLst>
+                    <a:outerShdw dist="35921" dir="2700000" algn="ctr" rotWithShape="0">
+                      <a:schemeClr val="bg2"/>
+                    </a:outerShdw>
+                  </a:effectLst>
+                </a14:hiddenEffects>
+              </a:ext>
+            </a:extLst>
+          </p:spPr>
+        </p:pic>
+        <p:pic>
+          <p:nvPicPr>
+            <p:cNvPr id="1033" name="Picture 9"/>
+            <p:cNvPicPr>
+              <a:picLocks noChangeAspect="1" noChangeArrowheads="1"/>
+            </p:cNvPicPr>
+            <p:nvPr/>
+          </p:nvPicPr>
+          <p:blipFill rotWithShape="1">
+            <a:blip r:embed="rId7">
+              <a:extLst>
+                <a:ext uri="{28A0092B-C50C-407E-A947-70E740481C1C}">
+                  <a14:useLocalDpi xmlns:a14="http://schemas.microsoft.com/office/drawing/2010/main" val="0"/>
+                </a:ext>
+              </a:extLst>
+            </a:blip>
+            <a:srcRect t="3689"/>
+            <a:stretch/>
+          </p:blipFill>
+          <p:spPr bwMode="auto">
+            <a:xfrm>
+              <a:off x="189370" y="1139366"/>
+              <a:ext cx="4387433" cy="2321678"/>
+            </a:xfrm>
+            <a:prstGeom prst="rect">
+              <a:avLst/>
+            </a:prstGeom>
+            <a:noFill/>
+            <a:ln>
+              <a:noFill/>
+            </a:ln>
+            <a:effectLst/>
+            <a:extLst>
+              <a:ext uri="{909E8E84-426E-40DD-AFC4-6F175D3DCCD1}">
+                <a14:hiddenFill xmlns:a14="http://schemas.microsoft.com/office/drawing/2010/main">
+                  <a:solidFill>
+                    <a:schemeClr val="accent1"/>
+                  </a:solidFill>
+                </a14:hiddenFill>
+              </a:ext>
+              <a:ext uri="{91240B29-F687-4F45-9708-019B960494DF}">
+                <a14:hiddenLine xmlns:a14="http://schemas.microsoft.com/office/drawing/2010/main" w="9525">
+                  <a:solidFill>
+                    <a:schemeClr val="tx1"/>
+                  </a:solidFill>
+                  <a:miter lim="800000"/>
+                  <a:headEnd/>
+                  <a:tailEnd/>
+                </a14:hiddenLine>
+              </a:ext>
+              <a:ext uri="{AF507438-7753-43E0-B8FC-AC1667EBCBE1}">
+                <a14:hiddenEffects xmlns:a14="http://schemas.microsoft.com/office/drawing/2010/main">
+                  <a:effectLst>
+                    <a:outerShdw dist="35921" dir="2700000" algn="ctr" rotWithShape="0">
+                      <a:schemeClr val="bg2"/>
+                    </a:outerShdw>
+                  </a:effectLst>
+                </a14:hiddenEffects>
+              </a:ext>
+            </a:extLst>
+          </p:spPr>
+        </p:pic>
+        <p:pic>
+          <p:nvPicPr>
+            <p:cNvPr id="1034" name="Picture 10"/>
+            <p:cNvPicPr>
+              <a:picLocks noChangeAspect="1" noChangeArrowheads="1"/>
+            </p:cNvPicPr>
+            <p:nvPr/>
+          </p:nvPicPr>
+          <p:blipFill>
+            <a:blip r:embed="rId8" cstate="print">
+              <a:extLst>
+                <a:ext uri="{28A0092B-C50C-407E-A947-70E740481C1C}">
+                  <a14:useLocalDpi xmlns:a14="http://schemas.microsoft.com/office/drawing/2010/main" val="0"/>
+                </a:ext>
+              </a:extLst>
+            </a:blip>
+            <a:srcRect/>
+            <a:stretch>
+              <a:fillRect/>
+            </a:stretch>
+          </p:blipFill>
+          <p:spPr bwMode="auto">
+            <a:xfrm>
+              <a:off x="135879" y="6873350"/>
+              <a:ext cx="4378832" cy="1575732"/>
+            </a:xfrm>
+            <a:prstGeom prst="rect">
+              <a:avLst/>
+            </a:prstGeom>
+            <a:noFill/>
+            <a:ln>
+              <a:noFill/>
+            </a:ln>
+            <a:effectLst/>
+            <a:extLst>
+              <a:ext uri="{909E8E84-426E-40DD-AFC4-6F175D3DCCD1}">
+                <a14:hiddenFill xmlns:a14="http://schemas.microsoft.com/office/drawing/2010/main">
+                  <a:solidFill>
+                    <a:schemeClr val="accent1"/>
+                  </a:solidFill>
+                </a14:hiddenFill>
+              </a:ext>
+              <a:ext uri="{91240B29-F687-4F45-9708-019B960494DF}">
+                <a14:hiddenLine xmlns:a14="http://schemas.microsoft.com/office/drawing/2010/main" w="9525">
+                  <a:solidFill>
+                    <a:schemeClr val="tx1"/>
+                  </a:solidFill>
+                  <a:miter lim="800000"/>
+                  <a:headEnd/>
+                  <a:tailEnd/>
+                </a14:hiddenLine>
+              </a:ext>
+              <a:ext uri="{AF507438-7753-43E0-B8FC-AC1667EBCBE1}">
+                <a14:hiddenEffects xmlns:a14="http://schemas.microsoft.com/office/drawing/2010/main">
+                  <a:effectLst>
+                    <a:outerShdw dist="35921" dir="2700000" algn="ctr" rotWithShape="0">
+                      <a:schemeClr val="bg2"/>
+                    </a:outerShdw>
+                  </a:effectLst>
+                </a14:hiddenEffects>
+              </a:ext>
+            </a:extLst>
+          </p:spPr>
+        </p:pic>
+        <p:pic>
+          <p:nvPicPr>
+            <p:cNvPr id="1039" name="Picture 15"/>
+            <p:cNvPicPr>
+              <a:picLocks noChangeAspect="1" noChangeArrowheads="1"/>
+            </p:cNvPicPr>
+            <p:nvPr/>
+          </p:nvPicPr>
+          <p:blipFill rotWithShape="1">
+            <a:blip r:embed="rId9">
+              <a:extLst>
+                <a:ext uri="{28A0092B-C50C-407E-A947-70E740481C1C}">
+                  <a14:useLocalDpi xmlns:a14="http://schemas.microsoft.com/office/drawing/2010/main" val="0"/>
+                </a:ext>
+              </a:extLst>
+            </a:blip>
+            <a:srcRect t="32986" r="34548" b="15589"/>
+            <a:stretch/>
+          </p:blipFill>
+          <p:spPr bwMode="auto">
+            <a:xfrm>
+              <a:off x="208534" y="4261998"/>
+              <a:ext cx="4387434" cy="2462451"/>
+            </a:xfrm>
+            <a:prstGeom prst="rect">
+              <a:avLst/>
+            </a:prstGeom>
+            <a:noFill/>
+            <a:ln>
+              <a:noFill/>
+            </a:ln>
+            <a:effectLst/>
+            <a:extLst>
+              <a:ext uri="{909E8E84-426E-40DD-AFC4-6F175D3DCCD1}">
+                <a14:hiddenFill xmlns:a14="http://schemas.microsoft.com/office/drawing/2010/main">
+                  <a:solidFill>
+                    <a:schemeClr val="accent1"/>
+                  </a:solidFill>
+                </a14:hiddenFill>
+              </a:ext>
+              <a:ext uri="{91240B29-F687-4F45-9708-019B960494DF}">
+                <a14:hiddenLine xmlns:a14="http://schemas.microsoft.com/office/drawing/2010/main" w="9525">
+                  <a:solidFill>
+                    <a:schemeClr val="tx1"/>
+                  </a:solidFill>
+                  <a:miter lim="800000"/>
+                  <a:headEnd/>
+                  <a:tailEnd/>
+                </a14:hiddenLine>
+              </a:ext>
+              <a:ext uri="{AF507438-7753-43E0-B8FC-AC1667EBCBE1}">
+                <a14:hiddenEffects xmlns:a14="http://schemas.microsoft.com/office/drawing/2010/main">
+                  <a:effectLst>
+                    <a:outerShdw dist="35921" dir="2700000" algn="ctr" rotWithShape="0">
+                      <a:schemeClr val="bg2"/>
+                    </a:outerShdw>
+                  </a:effectLst>
+                </a14:hiddenEffects>
+              </a:ext>
+            </a:extLst>
+          </p:spPr>
+        </p:pic>
+        <p:pic>
+          <p:nvPicPr>
+            <p:cNvPr id="1042" name="Picture 18"/>
+            <p:cNvPicPr>
+              <a:picLocks noChangeAspect="1" noChangeArrowheads="1"/>
+            </p:cNvPicPr>
+            <p:nvPr/>
+          </p:nvPicPr>
+          <p:blipFill>
+            <a:blip r:embed="rId10">
+              <a:extLst>
+                <a:ext uri="{28A0092B-C50C-407E-A947-70E740481C1C}">
+                  <a14:useLocalDpi xmlns:a14="http://schemas.microsoft.com/office/drawing/2010/main" val="0"/>
+                </a:ext>
+              </a:extLst>
+            </a:blip>
+            <a:srcRect/>
+            <a:stretch>
+              <a:fillRect/>
+            </a:stretch>
+          </p:blipFill>
+          <p:spPr bwMode="auto">
+            <a:xfrm>
+              <a:off x="198556" y="3433323"/>
+              <a:ext cx="4316155" cy="828675"/>
+            </a:xfrm>
+            <a:prstGeom prst="rect">
+              <a:avLst/>
+            </a:prstGeom>
+            <a:noFill/>
+            <a:ln>
+              <a:noFill/>
+            </a:ln>
+            <a:effectLst/>
+            <a:extLst>
+              <a:ext uri="{909E8E84-426E-40DD-AFC4-6F175D3DCCD1}">
+                <a14:hiddenFill xmlns:a14="http://schemas.microsoft.com/office/drawing/2010/main">
+                  <a:solidFill>
+                    <a:schemeClr val="accent1"/>
+                  </a:solidFill>
+                </a14:hiddenFill>
+              </a:ext>
+              <a:ext uri="{91240B29-F687-4F45-9708-019B960494DF}">
+                <a14:hiddenLine xmlns:a14="http://schemas.microsoft.com/office/drawing/2010/main" w="9525">
+                  <a:solidFill>
+                    <a:schemeClr val="tx1"/>
+                  </a:solidFill>
+                  <a:miter lim="800000"/>
+                  <a:headEnd/>
+                  <a:tailEnd/>
+                </a14:hiddenLine>
+              </a:ext>
+              <a:ext uri="{AF507438-7753-43E0-B8FC-AC1667EBCBE1}">
+                <a14:hiddenEffects xmlns:a14="http://schemas.microsoft.com/office/drawing/2010/main">
+                  <a:effectLst>
+                    <a:outerShdw dist="35921" dir="2700000" algn="ctr" rotWithShape="0">
+                      <a:schemeClr val="bg2"/>
+                    </a:outerShdw>
+                  </a:effectLst>
+                </a14:hiddenEffects>
+              </a:ext>
+            </a:extLst>
+          </p:spPr>
+        </p:pic>
+        <p:sp>
+          <p:nvSpPr>
+            <p:cNvPr id="10" name="직사각형 9"/>
+            <p:cNvSpPr/>
+            <p:nvPr/>
+          </p:nvSpPr>
+          <p:spPr>
+            <a:xfrm>
+              <a:off x="189370" y="1204976"/>
+              <a:ext cx="2880320" cy="2088232"/>
+            </a:xfrm>
+            <a:prstGeom prst="rect">
+              <a:avLst/>
+            </a:prstGeom>
+            <a:solidFill>
+              <a:schemeClr val="tx1">
+                <a:alpha val="50000"/>
+              </a:schemeClr>
+            </a:solidFill>
+          </p:spPr>
+          <p:style>
+            <a:lnRef idx="2">
+              <a:schemeClr val="accent1">
+                <a:shade val="50000"/>
+              </a:schemeClr>
+            </a:lnRef>
+            <a:fillRef idx="1">
+              <a:schemeClr val="accent1"/>
+            </a:fillRef>
+            <a:effectRef idx="0">
+              <a:schemeClr val="accent1"/>
+            </a:effectRef>
+            <a:fontRef idx="minor">
+              <a:schemeClr val="lt1"/>
+            </a:fontRef>
+          </p:style>
+          <p:txBody>
+            <a:bodyPr rtlCol="0" anchor="ctr"/>
+            <a:lstStyle/>
+            <a:p>
+              <a:pPr algn="ctr"/>
+              <a:r>
+                <a:rPr lang="en-US" altLang="ko-KR" b="1" dirty="0" smtClean="0"/>
+                <a:t>.video</a:t>
+              </a:r>
+              <a:endParaRPr lang="ko-KR" altLang="en-US" b="1" dirty="0"/>
+            </a:p>
+          </p:txBody>
+        </p:sp>
+        <p:sp>
+          <p:nvSpPr>
+            <p:cNvPr id="33" name="직사각형 32"/>
+            <p:cNvSpPr/>
+            <p:nvPr/>
+          </p:nvSpPr>
+          <p:spPr>
+            <a:xfrm>
+              <a:off x="3136643" y="1204976"/>
+              <a:ext cx="1440159" cy="2088232"/>
+            </a:xfrm>
+            <a:prstGeom prst="rect">
+              <a:avLst/>
+            </a:prstGeom>
+            <a:solidFill>
+              <a:schemeClr val="tx1">
+                <a:alpha val="50000"/>
+              </a:schemeClr>
+            </a:solidFill>
+          </p:spPr>
+          <p:style>
+            <a:lnRef idx="2">
+              <a:schemeClr val="accent1">
+                <a:shade val="50000"/>
+              </a:schemeClr>
+            </a:lnRef>
+            <a:fillRef idx="1">
+              <a:schemeClr val="accent1"/>
+            </a:fillRef>
+            <a:effectRef idx="0">
+              <a:schemeClr val="accent1"/>
+            </a:effectRef>
+            <a:fontRef idx="minor">
+              <a:schemeClr val="lt1"/>
+            </a:fontRef>
+          </p:style>
+          <p:txBody>
+            <a:bodyPr rtlCol="0" anchor="ctr"/>
+            <a:lstStyle/>
+            <a:p>
+              <a:pPr algn="ctr"/>
+              <a:r>
+                <a:rPr lang="en-US" altLang="ko-KR" b="1" dirty="0" smtClean="0"/>
+                <a:t>.videolist</a:t>
+              </a:r>
+              <a:endParaRPr lang="ko-KR" altLang="en-US" b="1" dirty="0"/>
+            </a:p>
+          </p:txBody>
+        </p:sp>
+        <p:sp>
+          <p:nvSpPr>
+            <p:cNvPr id="34" name="직사각형 33"/>
+            <p:cNvSpPr/>
+            <p:nvPr/>
+          </p:nvSpPr>
+          <p:spPr>
+            <a:xfrm>
+              <a:off x="4674429" y="3929828"/>
+              <a:ext cx="2028741" cy="1483467"/>
+            </a:xfrm>
+            <a:prstGeom prst="rect">
+              <a:avLst/>
+            </a:prstGeom>
+            <a:solidFill>
+              <a:schemeClr val="tx1">
+                <a:alpha val="50000"/>
+              </a:schemeClr>
+            </a:solidFill>
+          </p:spPr>
+          <p:style>
+            <a:lnRef idx="2">
+              <a:schemeClr val="accent1">
+                <a:shade val="50000"/>
+              </a:schemeClr>
+            </a:lnRef>
+            <a:fillRef idx="1">
+              <a:schemeClr val="accent1"/>
+            </a:fillRef>
+            <a:effectRef idx="0">
+              <a:schemeClr val="accent1"/>
+            </a:effectRef>
+            <a:fontRef idx="minor">
+              <a:schemeClr val="lt1"/>
+            </a:fontRef>
+          </p:style>
+          <p:txBody>
+            <a:bodyPr rtlCol="0" anchor="ctr"/>
+            <a:lstStyle/>
+            <a:p>
+              <a:pPr algn="ctr"/>
+              <a:r>
+                <a:rPr lang="en-US" altLang="ko-KR" dirty="0" smtClean="0"/>
+                <a:t>.</a:t>
+              </a:r>
+              <a:r>
+                <a:rPr lang="en-US" altLang="ko-KR" b="1" dirty="0" smtClean="0"/>
+                <a:t>sentence</a:t>
+              </a:r>
+              <a:endParaRPr lang="ko-KR" altLang="en-US" b="1" dirty="0"/>
+            </a:p>
+          </p:txBody>
+        </p:sp>
+        <p:sp>
+          <p:nvSpPr>
+            <p:cNvPr id="35" name="직사각형 34"/>
+            <p:cNvSpPr/>
+            <p:nvPr/>
+          </p:nvSpPr>
+          <p:spPr>
+            <a:xfrm>
+              <a:off x="4674430" y="5438727"/>
+              <a:ext cx="2028741" cy="3003095"/>
+            </a:xfrm>
+            <a:prstGeom prst="rect">
+              <a:avLst/>
+            </a:prstGeom>
+            <a:solidFill>
+              <a:schemeClr val="tx1">
+                <a:alpha val="50000"/>
+              </a:schemeClr>
+            </a:solidFill>
+          </p:spPr>
+          <p:style>
+            <a:lnRef idx="2">
+              <a:schemeClr val="accent1">
+                <a:shade val="50000"/>
+              </a:schemeClr>
+            </a:lnRef>
+            <a:fillRef idx="1">
+              <a:schemeClr val="accent1"/>
+            </a:fillRef>
+            <a:effectRef idx="0">
+              <a:schemeClr val="accent1"/>
+            </a:effectRef>
+            <a:fontRef idx="minor">
+              <a:schemeClr val="lt1"/>
+            </a:fontRef>
+          </p:style>
+          <p:txBody>
+            <a:bodyPr rtlCol="0" anchor="ctr"/>
+            <a:lstStyle/>
+            <a:p>
+              <a:pPr algn="ctr"/>
+              <a:r>
+                <a:rPr lang="en-US" altLang="ko-KR" b="1" dirty="0" smtClean="0"/>
+                <a:t>.words</a:t>
+              </a:r>
+              <a:endParaRPr lang="ko-KR" altLang="en-US" b="1" dirty="0"/>
+            </a:p>
+          </p:txBody>
+        </p:sp>
+        <p:pic>
+          <p:nvPicPr>
+            <p:cNvPr id="37" name="Picture 2"/>
+            <p:cNvPicPr>
+              <a:picLocks noChangeAspect="1" noChangeArrowheads="1"/>
+            </p:cNvPicPr>
+            <p:nvPr/>
+          </p:nvPicPr>
+          <p:blipFill rotWithShape="1">
+            <a:blip r:embed="rId11">
+              <a:extLst>
+                <a:ext uri="{28A0092B-C50C-407E-A947-70E740481C1C}">
+                  <a14:useLocalDpi xmlns:a14="http://schemas.microsoft.com/office/drawing/2010/main" val="0"/>
+                </a:ext>
+              </a:extLst>
+            </a:blip>
+            <a:srcRect l="26364" t="27186" r="25657" b="3534"/>
+            <a:stretch/>
+          </p:blipFill>
+          <p:spPr bwMode="auto">
+            <a:xfrm>
+              <a:off x="4725511" y="1213243"/>
+              <a:ext cx="2038160" cy="2462451"/>
+            </a:xfrm>
+            <a:prstGeom prst="rect">
+              <a:avLst/>
+            </a:prstGeom>
+            <a:noFill/>
+            <a:ln>
+              <a:noFill/>
+            </a:ln>
+            <a:effectLst/>
+            <a:extLst>
+              <a:ext uri="{909E8E84-426E-40DD-AFC4-6F175D3DCCD1}">
+                <a14:hiddenFill xmlns:a14="http://schemas.microsoft.com/office/drawing/2010/main">
+                  <a:solidFill>
+                    <a:schemeClr val="accent1"/>
+                  </a:solidFill>
+                </a14:hiddenFill>
+              </a:ext>
+              <a:ext uri="{91240B29-F687-4F45-9708-019B960494DF}">
+                <a14:hiddenLine xmlns:a14="http://schemas.microsoft.com/office/drawing/2010/main" w="9525">
+                  <a:solidFill>
+                    <a:schemeClr val="tx1"/>
+                  </a:solidFill>
+                  <a:miter lim="800000"/>
+                  <a:headEnd/>
+                  <a:tailEnd/>
+                </a14:hiddenLine>
+              </a:ext>
+              <a:ext uri="{AF507438-7753-43E0-B8FC-AC1667EBCBE1}">
+                <a14:hiddenEffects xmlns:a14="http://schemas.microsoft.com/office/drawing/2010/main">
+                  <a:effectLst>
+                    <a:outerShdw dist="35921" dir="2700000" algn="ctr" rotWithShape="0">
+                      <a:schemeClr val="bg2"/>
+                    </a:outerShdw>
+                  </a:effectLst>
+                </a14:hiddenEffects>
+              </a:ext>
+            </a:extLst>
+          </p:spPr>
+        </p:pic>
+        <p:sp>
+          <p:nvSpPr>
+            <p:cNvPr id="36" name="직사각형 35"/>
+            <p:cNvSpPr/>
+            <p:nvPr/>
+          </p:nvSpPr>
+          <p:spPr>
+            <a:xfrm>
+              <a:off x="4653136" y="1214565"/>
+              <a:ext cx="2028741" cy="2651066"/>
+            </a:xfrm>
+            <a:prstGeom prst="rect">
+              <a:avLst/>
+            </a:prstGeom>
+            <a:solidFill>
+              <a:schemeClr val="tx1">
+                <a:alpha val="50000"/>
+              </a:schemeClr>
+            </a:solidFill>
+          </p:spPr>
+          <p:style>
+            <a:lnRef idx="2">
+              <a:schemeClr val="accent1">
+                <a:shade val="50000"/>
+              </a:schemeClr>
+            </a:lnRef>
+            <a:fillRef idx="1">
+              <a:schemeClr val="accent1"/>
+            </a:fillRef>
+            <a:effectRef idx="0">
+              <a:schemeClr val="accent1"/>
+            </a:effectRef>
+            <a:fontRef idx="minor">
+              <a:schemeClr val="lt1"/>
+            </a:fontRef>
+          </p:style>
+          <p:txBody>
+            <a:bodyPr rtlCol="0" anchor="ctr"/>
+            <a:lstStyle/>
+            <a:p>
+              <a:pPr algn="ctr"/>
+              <a:r>
+                <a:rPr lang="en-US" altLang="ko-KR" b="1" dirty="0" smtClean="0"/>
+                <a:t>.quiz</a:t>
+              </a:r>
+              <a:endParaRPr lang="ko-KR" altLang="en-US" b="1" dirty="0"/>
+            </a:p>
+          </p:txBody>
+        </p:sp>
+        <p:sp>
+          <p:nvSpPr>
+            <p:cNvPr id="38" name="직사각형 37"/>
+            <p:cNvSpPr/>
+            <p:nvPr/>
+          </p:nvSpPr>
+          <p:spPr>
+            <a:xfrm>
+              <a:off x="135878" y="6873350"/>
+              <a:ext cx="4440923" cy="1575732"/>
+            </a:xfrm>
+            <a:prstGeom prst="rect">
+              <a:avLst/>
+            </a:prstGeom>
+            <a:solidFill>
+              <a:schemeClr val="tx1">
+                <a:alpha val="50000"/>
+              </a:schemeClr>
+            </a:solidFill>
+          </p:spPr>
+          <p:style>
+            <a:lnRef idx="2">
+              <a:schemeClr val="accent1">
+                <a:shade val="50000"/>
+              </a:schemeClr>
+            </a:lnRef>
+            <a:fillRef idx="1">
+              <a:schemeClr val="accent1"/>
+            </a:fillRef>
+            <a:effectRef idx="0">
+              <a:schemeClr val="accent1"/>
+            </a:effectRef>
+            <a:fontRef idx="minor">
+              <a:schemeClr val="lt1"/>
+            </a:fontRef>
+          </p:style>
+          <p:txBody>
+            <a:bodyPr rtlCol="0" anchor="ctr"/>
+            <a:lstStyle/>
+            <a:p>
+              <a:pPr algn="ctr"/>
+              <a:r>
+                <a:rPr lang="en-US" altLang="ko-KR" b="1" dirty="0" smtClean="0"/>
+                <a:t>.board</a:t>
+              </a:r>
+              <a:endParaRPr lang="ko-KR" altLang="en-US" b="1" dirty="0"/>
+            </a:p>
+          </p:txBody>
+        </p:sp>
+        <p:sp>
+          <p:nvSpPr>
+            <p:cNvPr id="39" name="직사각형 38"/>
+            <p:cNvSpPr/>
+            <p:nvPr/>
+          </p:nvSpPr>
+          <p:spPr>
+            <a:xfrm>
+              <a:off x="208536" y="3433323"/>
+              <a:ext cx="4387432" cy="828675"/>
+            </a:xfrm>
+            <a:prstGeom prst="rect">
+              <a:avLst/>
+            </a:prstGeom>
+            <a:solidFill>
+              <a:schemeClr val="tx1">
+                <a:alpha val="50000"/>
+              </a:schemeClr>
+            </a:solidFill>
+          </p:spPr>
+          <p:style>
+            <a:lnRef idx="2">
+              <a:schemeClr val="accent1">
+                <a:shade val="50000"/>
+              </a:schemeClr>
+            </a:lnRef>
+            <a:fillRef idx="1">
+              <a:schemeClr val="accent1"/>
+            </a:fillRef>
+            <a:effectRef idx="0">
+              <a:schemeClr val="accent1"/>
+            </a:effectRef>
+            <a:fontRef idx="minor">
+              <a:schemeClr val="lt1"/>
+            </a:fontRef>
+          </p:style>
+          <p:txBody>
+            <a:bodyPr rtlCol="0" anchor="ctr"/>
+            <a:lstStyle/>
+            <a:p>
+              <a:pPr algn="ctr"/>
+              <a:r>
+                <a:rPr lang="en-US" altLang="ko-KR" b="1" dirty="0" smtClean="0"/>
+                <a:t>.audio</a:t>
+              </a:r>
+              <a:endParaRPr lang="ko-KR" altLang="en-US" b="1" dirty="0"/>
+            </a:p>
+          </p:txBody>
+        </p:sp>
+        <p:sp>
+          <p:nvSpPr>
+            <p:cNvPr id="40" name="직사각형 39"/>
+            <p:cNvSpPr/>
+            <p:nvPr/>
+          </p:nvSpPr>
+          <p:spPr>
+            <a:xfrm>
+              <a:off x="208536" y="4346872"/>
+              <a:ext cx="4387432" cy="2377577"/>
+            </a:xfrm>
+            <a:prstGeom prst="rect">
+              <a:avLst/>
+            </a:prstGeom>
+            <a:solidFill>
+              <a:schemeClr val="tx1">
+                <a:alpha val="50000"/>
+              </a:schemeClr>
+            </a:solidFill>
+          </p:spPr>
+          <p:style>
+            <a:lnRef idx="2">
+              <a:schemeClr val="accent1">
+                <a:shade val="50000"/>
+              </a:schemeClr>
+            </a:lnRef>
+            <a:fillRef idx="1">
+              <a:schemeClr val="accent1"/>
+            </a:fillRef>
+            <a:effectRef idx="0">
+              <a:schemeClr val="accent1"/>
+            </a:effectRef>
+            <a:fontRef idx="minor">
+              <a:schemeClr val="lt1"/>
+            </a:fontRef>
+          </p:style>
+          <p:txBody>
+            <a:bodyPr rtlCol="0" anchor="ctr"/>
+            <a:lstStyle/>
+            <a:p>
+              <a:pPr algn="ctr"/>
+              <a:r>
+                <a:rPr lang="en-US" altLang="ko-KR" b="1" dirty="0" smtClean="0"/>
+                <a:t>.journal</a:t>
+              </a:r>
+              <a:endParaRPr lang="ko-KR" altLang="en-US" b="1" dirty="0"/>
+            </a:p>
+          </p:txBody>
+        </p:sp>
+        <p:sp>
+          <p:nvSpPr>
+            <p:cNvPr id="22" name="직사각형 21"/>
+            <p:cNvSpPr/>
+            <p:nvPr/>
+          </p:nvSpPr>
+          <p:spPr>
+            <a:xfrm>
+              <a:off x="28797" y="1139367"/>
+              <a:ext cx="6808321" cy="7465081"/>
+            </a:xfrm>
+            <a:prstGeom prst="rect">
+              <a:avLst/>
+            </a:prstGeom>
+            <a:noFill/>
+            <a:ln>
+              <a:solidFill>
+                <a:srgbClr val="FF0000"/>
+              </a:solidFill>
+            </a:ln>
+          </p:spPr>
+          <p:style>
+            <a:lnRef idx="2">
+              <a:schemeClr val="accent1">
+                <a:shade val="50000"/>
+              </a:schemeClr>
+            </a:lnRef>
+            <a:fillRef idx="1">
+              <a:schemeClr val="accent1"/>
+            </a:fillRef>
+            <a:effectRef idx="0">
+              <a:schemeClr val="accent1"/>
+            </a:effectRef>
+            <a:fontRef idx="minor">
+              <a:schemeClr val="lt1"/>
+            </a:fontRef>
+          </p:style>
+          <p:txBody>
+            <a:bodyPr rtlCol="0" anchor="ctr"/>
+            <a:lstStyle/>
+            <a:p>
+              <a:pPr algn="ctr"/>
+              <a:endParaRPr lang="ko-KR" altLang="en-US">
+                <a:solidFill>
+                  <a:schemeClr val="tx2"/>
+                </a:solidFill>
+              </a:endParaRPr>
+            </a:p>
+          </p:txBody>
+        </p:sp>
+        <p:sp>
+          <p:nvSpPr>
+            <p:cNvPr id="54" name="직사각형 53"/>
+            <p:cNvSpPr/>
+            <p:nvPr/>
+          </p:nvSpPr>
+          <p:spPr>
+            <a:xfrm>
+              <a:off x="4653136" y="1204976"/>
+              <a:ext cx="2050035" cy="7291214"/>
+            </a:xfrm>
+            <a:prstGeom prst="rect">
+              <a:avLst/>
+            </a:prstGeom>
+            <a:noFill/>
+            <a:ln>
+              <a:solidFill>
+                <a:srgbClr val="0000FF"/>
+              </a:solidFill>
+            </a:ln>
+          </p:spPr>
+          <p:style>
+            <a:lnRef idx="2">
+              <a:schemeClr val="accent1">
+                <a:shade val="50000"/>
+              </a:schemeClr>
+            </a:lnRef>
+            <a:fillRef idx="1">
+              <a:schemeClr val="accent1"/>
+            </a:fillRef>
+            <a:effectRef idx="0">
+              <a:schemeClr val="accent1"/>
+            </a:effectRef>
+            <a:fontRef idx="minor">
+              <a:schemeClr val="lt1"/>
+            </a:fontRef>
+          </p:style>
+          <p:txBody>
+            <a:bodyPr rtlCol="0" anchor="ctr"/>
+            <a:lstStyle/>
+            <a:p>
+              <a:pPr algn="ctr"/>
+              <a:endParaRPr lang="ko-KR" altLang="en-US">
+                <a:solidFill>
+                  <a:schemeClr val="tx2"/>
+                </a:solidFill>
+              </a:endParaRPr>
+            </a:p>
+          </p:txBody>
+        </p:sp>
+        <p:sp>
+          <p:nvSpPr>
+            <p:cNvPr id="55" name="직사각형 54"/>
+            <p:cNvSpPr/>
+            <p:nvPr/>
+          </p:nvSpPr>
+          <p:spPr>
+            <a:xfrm>
+              <a:off x="132024" y="1194661"/>
+              <a:ext cx="4444777" cy="7254421"/>
+            </a:xfrm>
+            <a:prstGeom prst="rect">
+              <a:avLst/>
+            </a:prstGeom>
+            <a:noFill/>
+            <a:ln>
+              <a:solidFill>
+                <a:srgbClr val="0000FF"/>
+              </a:solidFill>
+            </a:ln>
+          </p:spPr>
+          <p:style>
+            <a:lnRef idx="2">
+              <a:schemeClr val="accent1">
+                <a:shade val="50000"/>
+              </a:schemeClr>
+            </a:lnRef>
+            <a:fillRef idx="1">
+              <a:schemeClr val="accent1"/>
+            </a:fillRef>
+            <a:effectRef idx="0">
+              <a:schemeClr val="accent1"/>
+            </a:effectRef>
+            <a:fontRef idx="minor">
+              <a:schemeClr val="lt1"/>
+            </a:fontRef>
+          </p:style>
+          <p:txBody>
+            <a:bodyPr rtlCol="0" anchor="ctr"/>
+            <a:lstStyle/>
+            <a:p>
+              <a:pPr algn="ctr"/>
+              <a:endParaRPr lang="ko-KR" altLang="en-US">
+                <a:solidFill>
+                  <a:schemeClr val="tx2"/>
+                </a:solidFill>
+              </a:endParaRPr>
+            </a:p>
+          </p:txBody>
+        </p:sp>
+        <p:sp>
+          <p:nvSpPr>
+            <p:cNvPr id="63" name="TextBox 62"/>
+            <p:cNvSpPr txBox="1"/>
+            <p:nvPr/>
+          </p:nvSpPr>
+          <p:spPr>
+            <a:xfrm>
+              <a:off x="132023" y="1204976"/>
+              <a:ext cx="1873723" cy="369332"/>
+            </a:xfrm>
+            <a:prstGeom prst="rect">
+              <a:avLst/>
+            </a:prstGeom>
+            <a:solidFill>
+              <a:srgbClr val="0000FF"/>
+            </a:solidFill>
+          </p:spPr>
+          <p:txBody>
+            <a:bodyPr wrap="square" rtlCol="0">
+              <a:spAutoFit/>
+            </a:bodyPr>
+            <a:lstStyle>
+              <a:defPPr>
+                <a:defRPr lang="ko-KR"/>
+              </a:defPPr>
+              <a:lvl1pPr>
+                <a:defRPr b="1">
+                  <a:solidFill>
+                    <a:schemeClr val="bg1"/>
+                  </a:solidFill>
+                </a:defRPr>
+              </a:lvl1pPr>
+            </a:lstStyle>
+            <a:p>
+              <a:r>
+                <a:rPr lang="en-US" altLang="ko-KR" dirty="0"/>
+                <a:t>#content1</a:t>
+              </a:r>
+              <a:endParaRPr lang="ko-KR" altLang="en-US" dirty="0"/>
+            </a:p>
+          </p:txBody>
+        </p:sp>
+        <p:sp>
+          <p:nvSpPr>
+            <p:cNvPr id="64" name="TextBox 63"/>
+            <p:cNvSpPr txBox="1"/>
+            <p:nvPr/>
+          </p:nvSpPr>
+          <p:spPr>
+            <a:xfrm>
+              <a:off x="4635943" y="1213243"/>
+              <a:ext cx="2017982" cy="369332"/>
+            </a:xfrm>
+            <a:prstGeom prst="rect">
+              <a:avLst/>
+            </a:prstGeom>
+            <a:solidFill>
+              <a:srgbClr val="0000FF"/>
+            </a:solidFill>
+          </p:spPr>
+          <p:txBody>
+            <a:bodyPr wrap="square" rtlCol="0">
+              <a:spAutoFit/>
+            </a:bodyPr>
+            <a:lstStyle/>
+            <a:p>
+              <a:r>
+                <a:rPr lang="en-US" altLang="ko-KR" b="1" dirty="0" smtClean="0">
+                  <a:solidFill>
+                    <a:schemeClr val="bg1"/>
+                  </a:solidFill>
+                </a:rPr>
+                <a:t>#content2</a:t>
+              </a:r>
+              <a:endParaRPr lang="ko-KR" altLang="en-US" b="1" dirty="0">
+                <a:solidFill>
+                  <a:schemeClr val="bg1"/>
+                </a:solidFill>
+              </a:endParaRPr>
+            </a:p>
+          </p:txBody>
+        </p:sp>
+      </p:grpSp>
+      <p:sp>
+        <p:nvSpPr>
+          <p:cNvPr id="65" name="직사각형 64"/>
+          <p:cNvSpPr/>
+          <p:nvPr/>
+        </p:nvSpPr>
+        <p:spPr>
+          <a:xfrm>
+            <a:off x="78842" y="70120"/>
+            <a:ext cx="6758276" cy="254601"/>
+          </a:xfrm>
+          <a:prstGeom prst="rect">
+            <a:avLst/>
+          </a:prstGeom>
+          <a:noFill/>
+          <a:ln>
+            <a:solidFill>
+              <a:srgbClr val="0000FF"/>
+            </a:solidFill>
+          </a:ln>
+        </p:spPr>
+        <p:style>
+          <a:lnRef idx="2">
+            <a:schemeClr val="accent1">
+              <a:shade val="50000"/>
+            </a:schemeClr>
+          </a:lnRef>
+          <a:fillRef idx="1">
+            <a:schemeClr val="accent1"/>
+          </a:fillRef>
+          <a:effectRef idx="0">
+            <a:schemeClr val="accent1"/>
+          </a:effectRef>
+          <a:fontRef idx="minor">
+            <a:schemeClr val="lt1"/>
+          </a:fontRef>
+        </p:style>
+        <p:txBody>
+          <a:bodyPr rtlCol="0" anchor="ctr"/>
+          <a:lstStyle/>
+          <a:p>
+            <a:pPr algn="ctr"/>
+            <a:endParaRPr lang="ko-KR" altLang="en-US">
+              <a:solidFill>
+                <a:schemeClr val="tx2"/>
+              </a:solidFill>
+            </a:endParaRPr>
+          </a:p>
+        </p:txBody>
+      </p:sp>
+      <p:sp>
+        <p:nvSpPr>
+          <p:cNvPr id="66" name="TextBox 65"/>
+          <p:cNvSpPr txBox="1"/>
+          <p:nvPr/>
+        </p:nvSpPr>
+        <p:spPr>
+          <a:xfrm>
+            <a:off x="6834561" y="-18637"/>
+            <a:ext cx="1746002" cy="369332"/>
+          </a:xfrm>
+          <a:prstGeom prst="rect">
+            <a:avLst/>
+          </a:prstGeom>
+          <a:solidFill>
+            <a:srgbClr val="0000FF"/>
+          </a:solidFill>
+        </p:spPr>
+        <p:txBody>
+          <a:bodyPr wrap="square" rtlCol="0">
+            <a:spAutoFit/>
+          </a:bodyPr>
+          <a:lstStyle/>
+          <a:p>
+            <a:r>
+              <a:rPr lang="en-US" altLang="ko-KR" b="1" dirty="0" smtClean="0">
+                <a:solidFill>
+                  <a:schemeClr val="bg1"/>
+                </a:solidFill>
+              </a:rPr>
+              <a:t>#</a:t>
+            </a:r>
+            <a:r>
+              <a:rPr lang="en-US" altLang="ko-KR" b="1" dirty="0" smtClean="0">
+                <a:solidFill>
+                  <a:schemeClr val="bg1"/>
+                </a:solidFill>
+              </a:rPr>
+              <a:t>header_row1</a:t>
+            </a:r>
+            <a:endParaRPr lang="ko-KR" altLang="en-US" b="1" dirty="0">
+              <a:solidFill>
+                <a:schemeClr val="bg1"/>
+              </a:solidFill>
+            </a:endParaRPr>
+          </a:p>
+        </p:txBody>
+      </p:sp>
+      <p:sp>
+        <p:nvSpPr>
+          <p:cNvPr id="68" name="직사각형 67"/>
+          <p:cNvSpPr/>
+          <p:nvPr/>
+        </p:nvSpPr>
+        <p:spPr>
+          <a:xfrm>
+            <a:off x="54198" y="827584"/>
+            <a:ext cx="6803802" cy="256786"/>
+          </a:xfrm>
+          <a:prstGeom prst="rect">
+            <a:avLst/>
+          </a:prstGeom>
+          <a:noFill/>
+          <a:ln>
+            <a:solidFill>
+              <a:srgbClr val="0000FF"/>
+            </a:solidFill>
+          </a:ln>
+        </p:spPr>
+        <p:style>
+          <a:lnRef idx="2">
+            <a:schemeClr val="accent1">
+              <a:shade val="50000"/>
+            </a:schemeClr>
+          </a:lnRef>
+          <a:fillRef idx="1">
+            <a:schemeClr val="accent1"/>
+          </a:fillRef>
+          <a:effectRef idx="0">
+            <a:schemeClr val="accent1"/>
+          </a:effectRef>
+          <a:fontRef idx="minor">
+            <a:schemeClr val="lt1"/>
+          </a:fontRef>
+        </p:style>
+        <p:txBody>
+          <a:bodyPr rtlCol="0" anchor="ctr"/>
+          <a:lstStyle/>
+          <a:p>
+            <a:pPr algn="ctr"/>
+            <a:endParaRPr lang="ko-KR" altLang="en-US">
+              <a:solidFill>
+                <a:schemeClr val="tx2"/>
+              </a:solidFill>
+            </a:endParaRPr>
+          </a:p>
+        </p:txBody>
+      </p:sp>
+      <p:sp>
+        <p:nvSpPr>
+          <p:cNvPr id="69" name="TextBox 68"/>
+          <p:cNvSpPr txBox="1"/>
+          <p:nvPr/>
+        </p:nvSpPr>
+        <p:spPr>
+          <a:xfrm>
+            <a:off x="6837118" y="748983"/>
+            <a:ext cx="1566454" cy="369332"/>
+          </a:xfrm>
+          <a:prstGeom prst="rect">
+            <a:avLst/>
+          </a:prstGeom>
+          <a:solidFill>
+            <a:srgbClr val="0000FF"/>
+          </a:solidFill>
+        </p:spPr>
+        <p:txBody>
+          <a:bodyPr wrap="none" rtlCol="0">
+            <a:spAutoFit/>
+          </a:bodyPr>
+          <a:lstStyle/>
+          <a:p>
+            <a:r>
+              <a:rPr lang="en-US" altLang="ko-KR" b="1" dirty="0" smtClean="0">
+                <a:solidFill>
+                  <a:schemeClr val="bg1"/>
+                </a:solidFill>
+              </a:rPr>
+              <a:t>#header_nav</a:t>
+            </a:r>
+            <a:endParaRPr lang="ko-KR" altLang="en-US" b="1" dirty="0">
+              <a:solidFill>
+                <a:schemeClr val="bg1"/>
+              </a:solidFill>
+            </a:endParaRPr>
+          </a:p>
+        </p:txBody>
+      </p:sp>
+      <p:pic>
+        <p:nvPicPr>
+          <p:cNvPr id="1044" name="Picture 20"/>
+          <p:cNvPicPr>
+            <a:picLocks noChangeAspect="1" noChangeArrowheads="1"/>
+          </p:cNvPicPr>
+          <p:nvPr/>
+        </p:nvPicPr>
+        <p:blipFill>
+          <a:blip r:embed="rId12">
+            <a:extLst>
+              <a:ext uri="{28A0092B-C50C-407E-A947-70E740481C1C}">
+                <a14:useLocalDpi xmlns:a14="http://schemas.microsoft.com/office/drawing/2010/main" val="0"/>
+              </a:ext>
+            </a:extLst>
+          </a:blip>
+          <a:srcRect/>
+          <a:stretch>
+            <a:fillRect/>
+          </a:stretch>
+        </p:blipFill>
+        <p:spPr bwMode="auto">
+          <a:xfrm>
+            <a:off x="8613576" y="83697"/>
+            <a:ext cx="12105245" cy="5679033"/>
+          </a:xfrm>
+          <a:prstGeom prst="rect">
+            <a:avLst/>
+          </a:prstGeom>
+          <a:noFill/>
+          <a:ln>
+            <a:noFill/>
+          </a:ln>
+          <a:effectLst/>
+          <a:extLst>
+            <a:ext uri="{909E8E84-426E-40DD-AFC4-6F175D3DCCD1}">
+              <a14:hiddenFill xmlns:a14="http://schemas.microsoft.com/office/drawing/2010/main">
+                <a:solidFill>
+                  <a:schemeClr val="accent1"/>
+                </a:solidFill>
+              </a14:hiddenFill>
+            </a:ext>
+            <a:ext uri="{91240B29-F687-4F45-9708-019B960494DF}">
+              <a14:hiddenLine xmlns:a14="http://schemas.microsoft.com/office/drawing/2010/main" w="9525">
+                <a:solidFill>
+                  <a:schemeClr val="tx1"/>
+                </a:solidFill>
+                <a:miter lim="800000"/>
+                <a:headEnd/>
+                <a:tailEnd/>
+              </a14:hiddenLine>
+            </a:ext>
+            <a:ext uri="{AF507438-7753-43E0-B8FC-AC1667EBCBE1}">
+              <a14:hiddenEffects xmlns:a14="http://schemas.microsoft.com/office/drawing/2010/main">
+                <a:effectLst>
+                  <a:outerShdw dist="35921" dir="2700000" algn="ctr" rotWithShape="0">
+                    <a:schemeClr val="bg2"/>
+                  </a:outerShdw>
+                </a:effectLst>
+              </a14:hiddenEffects>
+            </a:ext>
+          </a:extLst>
+        </p:spPr>
+      </p:pic>
+      <p:pic>
+        <p:nvPicPr>
+          <p:cNvPr id="1045" name="Picture 21"/>
+          <p:cNvPicPr>
+            <a:picLocks noChangeAspect="1" noChangeArrowheads="1"/>
+          </p:cNvPicPr>
+          <p:nvPr/>
+        </p:nvPicPr>
+        <p:blipFill>
+          <a:blip r:embed="rId13">
+            <a:extLst>
+              <a:ext uri="{28A0092B-C50C-407E-A947-70E740481C1C}">
+                <a14:useLocalDpi xmlns:a14="http://schemas.microsoft.com/office/drawing/2010/main" val="0"/>
+              </a:ext>
+            </a:extLst>
+          </a:blip>
+          <a:srcRect/>
+          <a:stretch>
+            <a:fillRect/>
+          </a:stretch>
+        </p:blipFill>
+        <p:spPr bwMode="auto">
+          <a:xfrm>
+            <a:off x="8630954" y="6099065"/>
+            <a:ext cx="4016375" cy="4794250"/>
+          </a:xfrm>
+          <a:prstGeom prst="rect">
+            <a:avLst/>
+          </a:prstGeom>
+          <a:noFill/>
+          <a:ln>
+            <a:noFill/>
+          </a:ln>
+          <a:effectLst/>
+          <a:extLst>
+            <a:ext uri="{909E8E84-426E-40DD-AFC4-6F175D3DCCD1}">
+              <a14:hiddenFill xmlns:a14="http://schemas.microsoft.com/office/drawing/2010/main">
+                <a:solidFill>
+                  <a:schemeClr val="accent1"/>
+                </a:solidFill>
+              </a14:hiddenFill>
+            </a:ext>
+            <a:ext uri="{91240B29-F687-4F45-9708-019B960494DF}">
+              <a14:hiddenLine xmlns:a14="http://schemas.microsoft.com/office/drawing/2010/main" w="9525">
+                <a:solidFill>
+                  <a:schemeClr val="tx1"/>
+                </a:solidFill>
+                <a:miter lim="800000"/>
+                <a:headEnd/>
+                <a:tailEnd/>
+              </a14:hiddenLine>
+            </a:ext>
+            <a:ext uri="{AF507438-7753-43E0-B8FC-AC1667EBCBE1}">
+              <a14:hiddenEffects xmlns:a14="http://schemas.microsoft.com/office/drawing/2010/main">
+                <a:effectLst>
+                  <a:outerShdw dist="35921" dir="2700000" algn="ctr" rotWithShape="0">
+                    <a:schemeClr val="bg2"/>
+                  </a:outerShdw>
+                </a:effectLst>
+              </a14:hiddenEffects>
+            </a:ext>
+          </a:extLst>
+        </p:spPr>
+      </p:pic>
+      <p:sp>
+        <p:nvSpPr>
+          <p:cNvPr id="72" name="직사각형 71"/>
+          <p:cNvSpPr/>
+          <p:nvPr/>
+        </p:nvSpPr>
+        <p:spPr>
+          <a:xfrm>
+            <a:off x="-891480" y="83697"/>
+            <a:ext cx="1305296" cy="237561"/>
+          </a:xfrm>
+          <a:prstGeom prst="rect">
+            <a:avLst/>
+          </a:prstGeom>
+          <a:solidFill>
+            <a:schemeClr val="tx1">
+              <a:alpha val="50000"/>
+            </a:schemeClr>
+          </a:solidFill>
+        </p:spPr>
+        <p:style>
+          <a:lnRef idx="2">
+            <a:schemeClr val="accent1">
+              <a:shade val="50000"/>
+            </a:schemeClr>
+          </a:lnRef>
+          <a:fillRef idx="1">
+            <a:schemeClr val="accent1"/>
+          </a:fillRef>
+          <a:effectRef idx="0">
+            <a:schemeClr val="accent1"/>
+          </a:effectRef>
+          <a:fontRef idx="minor">
+            <a:schemeClr val="lt1"/>
+          </a:fontRef>
+        </p:style>
+        <p:txBody>
+          <a:bodyPr rtlCol="0" anchor="ctr"/>
+          <a:lstStyle/>
+          <a:p>
+            <a:pPr algn="ctr"/>
+            <a:r>
+              <a:rPr lang="en-US" altLang="ko-KR" sz="1400" b="1" dirty="0" smtClean="0"/>
+              <a:t>img.menu</a:t>
+            </a:r>
+            <a:endParaRPr lang="ko-KR" altLang="en-US" sz="1400" b="1" dirty="0"/>
+          </a:p>
+        </p:txBody>
+      </p:sp>
+      <p:sp>
+        <p:nvSpPr>
+          <p:cNvPr id="73" name="직사각형 72"/>
+          <p:cNvSpPr/>
+          <p:nvPr/>
+        </p:nvSpPr>
+        <p:spPr>
+          <a:xfrm>
+            <a:off x="55100" y="323528"/>
+            <a:ext cx="6802900" cy="504056"/>
+          </a:xfrm>
+          <a:prstGeom prst="rect">
+            <a:avLst/>
+          </a:prstGeom>
+          <a:noFill/>
+          <a:ln>
+            <a:solidFill>
+              <a:srgbClr val="0000FF"/>
+            </a:solidFill>
+          </a:ln>
+        </p:spPr>
+        <p:style>
+          <a:lnRef idx="2">
+            <a:schemeClr val="accent1">
+              <a:shade val="50000"/>
+            </a:schemeClr>
+          </a:lnRef>
+          <a:fillRef idx="1">
+            <a:schemeClr val="accent1"/>
+          </a:fillRef>
+          <a:effectRef idx="0">
+            <a:schemeClr val="accent1"/>
+          </a:effectRef>
+          <a:fontRef idx="minor">
+            <a:schemeClr val="lt1"/>
+          </a:fontRef>
+        </p:style>
+        <p:txBody>
+          <a:bodyPr rtlCol="0" anchor="ctr"/>
+          <a:lstStyle/>
+          <a:p>
+            <a:pPr algn="ctr"/>
+            <a:endParaRPr lang="ko-KR" altLang="en-US">
+              <a:solidFill>
+                <a:schemeClr val="tx2"/>
+              </a:solidFill>
+            </a:endParaRPr>
+          </a:p>
+        </p:txBody>
+      </p:sp>
+      <p:sp>
+        <p:nvSpPr>
+          <p:cNvPr id="74" name="TextBox 73"/>
+          <p:cNvSpPr txBox="1"/>
+          <p:nvPr/>
+        </p:nvSpPr>
+        <p:spPr>
+          <a:xfrm>
+            <a:off x="6853359" y="371368"/>
+            <a:ext cx="1727204" cy="369332"/>
+          </a:xfrm>
+          <a:prstGeom prst="rect">
+            <a:avLst/>
+          </a:prstGeom>
+          <a:solidFill>
+            <a:srgbClr val="0000FF"/>
+          </a:solidFill>
+        </p:spPr>
+        <p:txBody>
+          <a:bodyPr wrap="none" rtlCol="0">
+            <a:spAutoFit/>
+          </a:bodyPr>
+          <a:lstStyle/>
+          <a:p>
+            <a:r>
+              <a:rPr lang="en-US" altLang="ko-KR" b="1" dirty="0" smtClean="0">
+                <a:solidFill>
+                  <a:schemeClr val="bg1"/>
+                </a:solidFill>
+              </a:rPr>
+              <a:t>#header_row2</a:t>
+            </a:r>
+            <a:endParaRPr lang="ko-KR" altLang="en-US" b="1" dirty="0">
+              <a:solidFill>
+                <a:schemeClr val="bg1"/>
+              </a:solidFill>
+            </a:endParaRPr>
+          </a:p>
+        </p:txBody>
+      </p:sp>
+      <p:sp>
+        <p:nvSpPr>
+          <p:cNvPr id="75" name="직사각형 74"/>
+          <p:cNvSpPr/>
+          <p:nvPr/>
+        </p:nvSpPr>
+        <p:spPr>
+          <a:xfrm>
+            <a:off x="54198" y="539708"/>
+            <a:ext cx="1000359" cy="256519"/>
+          </a:xfrm>
+          <a:prstGeom prst="rect">
+            <a:avLst/>
+          </a:prstGeom>
+          <a:solidFill>
+            <a:schemeClr val="tx1">
+              <a:alpha val="50000"/>
+            </a:schemeClr>
+          </a:solidFill>
+        </p:spPr>
+        <p:style>
+          <a:lnRef idx="2">
+            <a:schemeClr val="accent1">
+              <a:shade val="50000"/>
+            </a:schemeClr>
+          </a:lnRef>
+          <a:fillRef idx="1">
+            <a:schemeClr val="accent1"/>
+          </a:fillRef>
+          <a:effectRef idx="0">
+            <a:schemeClr val="accent1"/>
+          </a:effectRef>
+          <a:fontRef idx="minor">
+            <a:schemeClr val="lt1"/>
+          </a:fontRef>
+        </p:style>
+        <p:txBody>
+          <a:bodyPr rtlCol="0" anchor="ctr"/>
+          <a:lstStyle/>
+          <a:p>
+            <a:pPr algn="ctr"/>
+            <a:r>
+              <a:rPr lang="en-US" altLang="ko-KR" sz="1200" b="1" dirty="0" smtClean="0"/>
+              <a:t>.date</a:t>
+            </a:r>
+            <a:endParaRPr lang="ko-KR" altLang="en-US" sz="1200" b="1" dirty="0"/>
+          </a:p>
+        </p:txBody>
+      </p:sp>
+      <p:pic>
+        <p:nvPicPr>
+          <p:cNvPr id="1046" name="Picture 22"/>
+          <p:cNvPicPr>
+            <a:picLocks noChangeAspect="1" noChangeArrowheads="1"/>
+          </p:cNvPicPr>
+          <p:nvPr/>
+        </p:nvPicPr>
+        <p:blipFill>
+          <a:blip r:embed="rId14" cstate="print">
+            <a:extLst>
+              <a:ext uri="{28A0092B-C50C-407E-A947-70E740481C1C}">
+                <a14:useLocalDpi xmlns:a14="http://schemas.microsoft.com/office/drawing/2010/main" val="0"/>
+              </a:ext>
+            </a:extLst>
+          </a:blip>
+          <a:srcRect/>
+          <a:stretch>
+            <a:fillRect/>
+          </a:stretch>
+        </p:blipFill>
+        <p:spPr bwMode="auto">
+          <a:xfrm>
+            <a:off x="-8187690" y="6649774"/>
+            <a:ext cx="6486838" cy="3199394"/>
+          </a:xfrm>
+          <a:prstGeom prst="rect">
+            <a:avLst/>
+          </a:prstGeom>
+          <a:noFill/>
+          <a:ln>
+            <a:noFill/>
+          </a:ln>
+          <a:effectLst/>
+          <a:extLst>
+            <a:ext uri="{909E8E84-426E-40DD-AFC4-6F175D3DCCD1}">
+              <a14:hiddenFill xmlns:a14="http://schemas.microsoft.com/office/drawing/2010/main">
+                <a:solidFill>
+                  <a:schemeClr val="accent1"/>
+                </a:solidFill>
+              </a14:hiddenFill>
+            </a:ext>
+            <a:ext uri="{91240B29-F687-4F45-9708-019B960494DF}">
+              <a14:hiddenLine xmlns:a14="http://schemas.microsoft.com/office/drawing/2010/main" w="9525">
+                <a:solidFill>
+                  <a:schemeClr val="tx1"/>
+                </a:solidFill>
+                <a:miter lim="800000"/>
+                <a:headEnd/>
+                <a:tailEnd/>
+              </a14:hiddenLine>
+            </a:ext>
+            <a:ext uri="{AF507438-7753-43E0-B8FC-AC1667EBCBE1}">
+              <a14:hiddenEffects xmlns:a14="http://schemas.microsoft.com/office/drawing/2010/main">
+                <a:effectLst>
+                  <a:outerShdw dist="35921" dir="2700000" algn="ctr" rotWithShape="0">
+                    <a:schemeClr val="bg2"/>
+                  </a:outerShdw>
+                </a:effectLst>
+              </a14:hiddenEffects>
+            </a:ext>
+          </a:extLst>
+        </p:spPr>
+      </p:pic>
+      <p:sp>
+        <p:nvSpPr>
+          <p:cNvPr id="79" name="직사각형 78"/>
+          <p:cNvSpPr/>
+          <p:nvPr/>
+        </p:nvSpPr>
+        <p:spPr>
+          <a:xfrm>
+            <a:off x="-23191" y="1139367"/>
+            <a:ext cx="974227" cy="7465081"/>
+          </a:xfrm>
+          <a:prstGeom prst="rect">
+            <a:avLst/>
+          </a:prstGeom>
+          <a:solidFill>
+            <a:schemeClr val="tx1">
+              <a:alpha val="50000"/>
+            </a:schemeClr>
+          </a:solidFill>
+        </p:spPr>
+        <p:style>
+          <a:lnRef idx="2">
+            <a:schemeClr val="accent1">
+              <a:shade val="50000"/>
+            </a:schemeClr>
+          </a:lnRef>
+          <a:fillRef idx="1">
+            <a:schemeClr val="accent1"/>
+          </a:fillRef>
+          <a:effectRef idx="0">
+            <a:schemeClr val="accent1"/>
+          </a:effectRef>
+          <a:fontRef idx="minor">
+            <a:schemeClr val="lt1"/>
+          </a:fontRef>
+        </p:style>
+        <p:txBody>
+          <a:bodyPr rtlCol="0" anchor="ctr"/>
+          <a:lstStyle/>
+          <a:p>
+            <a:pPr algn="ctr"/>
+            <a:r>
+              <a:rPr lang="en-US" altLang="ko-KR" b="1" dirty="0" smtClean="0"/>
+              <a:t>.</a:t>
+            </a:r>
+            <a:r>
+              <a:rPr lang="en-US" altLang="ko-KR" b="1" dirty="0"/>
+              <a:t>g</a:t>
+            </a:r>
+            <a:r>
+              <a:rPr lang="en-US" altLang="ko-KR" b="1" dirty="0" smtClean="0"/>
+              <a:t>nb</a:t>
+            </a:r>
+            <a:endParaRPr lang="ko-KR" altLang="en-US" b="1" dirty="0"/>
+          </a:p>
+        </p:txBody>
+      </p:sp>
+    </p:spTree>
+    <p:extLst>
+      <p:ext uri="{BB962C8B-B14F-4D97-AF65-F5344CB8AC3E}">
+        <p14:creationId xmlns:p14="http://schemas.microsoft.com/office/powerpoint/2010/main" val="395347484"/>
+      </p:ext>
+    </p:extLst>
+  </p:cSld>
+  <p:clrMapOvr>
+    <a:masterClrMapping/>
+  </p:clrMapOvr>
+  <p:timing>
+    <p:tnLst>
+      <p:par>
+        <p:cTn id="1" dur="indefinite" restart="never" nodeType="tmRoot"/>
+      </p:par>
+    </p:tnLst>
+  </p:timing>
+</p:sld>
+</file>
+
+<file path=ppt/slides/slide3.xml><?xml version="1.0" encoding="utf-8"?>
+<p:sld xmlns:a="http://schemas.openxmlformats.org/drawingml/2006/main" xmlns:r="http://schemas.openxmlformats.org/officeDocument/2006/relationships" xmlns:p="http://schemas.openxmlformats.org/presentationml/2006/main">
+  <p:cSld>
+    <p:spTree>
+      <p:nvGrpSpPr>
+        <p:cNvPr id="1" name=""/>
+        <p:cNvGrpSpPr/>
+        <p:nvPr/>
+      </p:nvGrpSpPr>
+      <p:grpSpPr>
+        <a:xfrm>
+          <a:off x="0" y="0"/>
+          <a:ext cx="0" cy="0"/>
+          <a:chOff x="0" y="0"/>
+          <a:chExt cx="0" cy="0"/>
+        </a:xfrm>
+      </p:grpSpPr>
+      <p:pic>
+        <p:nvPicPr>
+          <p:cNvPr id="2051" name="Picture 3"/>
+          <p:cNvPicPr>
+            <a:picLocks noChangeAspect="1" noChangeArrowheads="1"/>
+          </p:cNvPicPr>
+          <p:nvPr/>
+        </p:nvPicPr>
+        <p:blipFill>
+          <a:blip r:embed="rId2">
+            <a:extLst>
+              <a:ext uri="{28A0092B-C50C-407E-A947-70E740481C1C}">
+                <a14:useLocalDpi xmlns:a14="http://schemas.microsoft.com/office/drawing/2010/main" val="0"/>
+              </a:ext>
+            </a:extLst>
+          </a:blip>
+          <a:srcRect/>
+          <a:stretch>
+            <a:fillRect/>
+          </a:stretch>
+        </p:blipFill>
+        <p:spPr bwMode="auto">
+          <a:xfrm>
+            <a:off x="0" y="639763"/>
+            <a:ext cx="6858000" cy="7862887"/>
+          </a:xfrm>
+          <a:prstGeom prst="rect">
+            <a:avLst/>
+          </a:prstGeom>
+          <a:noFill/>
+          <a:ln>
+            <a:noFill/>
+          </a:ln>
+          <a:effectLst/>
+          <a:extLst>
+            <a:ext uri="{909E8E84-426E-40DD-AFC4-6F175D3DCCD1}">
+              <a14:hiddenFill xmlns:a14="http://schemas.microsoft.com/office/drawing/2010/main">
+                <a:solidFill>
+                  <a:schemeClr val="accent1"/>
+                </a:solidFill>
+              </a14:hiddenFill>
+            </a:ext>
+            <a:ext uri="{91240B29-F687-4F45-9708-019B960494DF}">
+              <a14:hiddenLine xmlns:a14="http://schemas.microsoft.com/office/drawing/2010/main" w="9525">
+                <a:solidFill>
+                  <a:schemeClr val="tx1"/>
+                </a:solidFill>
+                <a:miter lim="800000"/>
+                <a:headEnd/>
+                <a:tailEnd/>
+              </a14:hiddenLine>
+            </a:ext>
+            <a:ext uri="{AF507438-7753-43E0-B8FC-AC1667EBCBE1}">
+              <a14:hiddenEffects xmlns:a14="http://schemas.microsoft.com/office/drawing/2010/main">
+                <a:effectLst>
+                  <a:outerShdw dist="35921" dir="2700000" algn="ctr" rotWithShape="0">
+                    <a:schemeClr val="bg2"/>
+                  </a:outerShdw>
+                </a:effectLst>
+              </a14:hiddenEffects>
+            </a:ext>
+          </a:extLst>
+        </p:spPr>
+      </p:pic>
     </p:spTree>
     <p:extLst>
       <p:ext uri="{BB962C8B-B14F-4D97-AF65-F5344CB8AC3E}">
@@ -5921,7 +8583,7 @@
 </p:sld>
 </file>
 
-<file path=ppt/slides/slide3.xml><?xml version="1.0" encoding="utf-8"?>
+<file path=ppt/slides/slide4.xml><?xml version="1.0" encoding="utf-8"?>
 <p:sld xmlns:a="http://schemas.openxmlformats.org/drawingml/2006/main" xmlns:r="http://schemas.openxmlformats.org/officeDocument/2006/relationships" xmlns:p="http://schemas.openxmlformats.org/presentationml/2006/main">
   <p:cSld>
     <p:spTree>

</xml_diff>